<commit_message>
DataBase almost ready experimental stages complete. Creating new item works
</commit_message>
<xml_diff>
--- a/design/Design_ppt-ben.pptx
+++ b/design/Design_ppt-ben.pptx
@@ -2,12 +2,15 @@
 <file path=ppt/presentation.xml><?xml version="1.0" encoding="utf-8"?>
 <p:presentation xmlns:a="http://schemas.openxmlformats.org/drawingml/2006/main" xmlns:r="http://schemas.openxmlformats.org/officeDocument/2006/relationships" xmlns:p="http://schemas.openxmlformats.org/presentationml/2006/main" saveSubsetFonts="1">
   <p:sldMasterIdLst>
-    <p:sldMasterId id="2147483648" r:id="rId1"/>
+    <p:sldMasterId id="2147483660" r:id="rId1"/>
   </p:sldMasterIdLst>
   <p:sldIdLst>
-    <p:sldId id="257" r:id="rId2"/>
-    <p:sldId id="256" r:id="rId3"/>
-    <p:sldId id="258" r:id="rId4"/>
+    <p:sldId id="259" r:id="rId2"/>
+    <p:sldId id="257" r:id="rId3"/>
+    <p:sldId id="256" r:id="rId4"/>
+    <p:sldId id="258" r:id="rId5"/>
+    <p:sldId id="260" r:id="rId6"/>
+    <p:sldId id="261" r:id="rId7"/>
   </p:sldIdLst>
   <p:sldSz cx="12192000" cy="6858000"/>
   <p:notesSz cx="6858000" cy="9144000"/>
@@ -106,7 +109,827 @@
       </a:defRPr>
     </a:lvl9pPr>
   </p:defaultTextStyle>
+  <p:extLst>
+    <p:ext uri="{EFAFB233-063F-42B5-8137-9DF3F51BA10A}">
+      <p15:sldGuideLst xmlns:p15="http://schemas.microsoft.com/office/powerpoint/2012/main"/>
+    </p:ext>
+  </p:extLst>
 </p:presentation>
+</file>
+
+<file path=ppt/charts/chart1.xml><?xml version="1.0" encoding="utf-8"?>
+<c:chartSpace xmlns:c="http://schemas.openxmlformats.org/drawingml/2006/chart" xmlns:a="http://schemas.openxmlformats.org/drawingml/2006/main" xmlns:r="http://schemas.openxmlformats.org/officeDocument/2006/relationships" xmlns:c16r2="http://schemas.microsoft.com/office/drawing/2015/06/chart">
+  <c:date1904 val="0"/>
+  <c:lang val="hu-HU"/>
+  <c:roundedCorners val="0"/>
+  <mc:AlternateContent xmlns:mc="http://schemas.openxmlformats.org/markup-compatibility/2006">
+    <mc:Choice xmlns:c14="http://schemas.microsoft.com/office/drawing/2007/8/2/chart" Requires="c14">
+      <c14:style val="102"/>
+    </mc:Choice>
+    <mc:Fallback>
+      <c:style val="2"/>
+    </mc:Fallback>
+  </mc:AlternateContent>
+  <c:chart>
+    <c:title>
+      <c:overlay val="0"/>
+      <c:spPr>
+        <a:noFill/>
+        <a:ln>
+          <a:noFill/>
+        </a:ln>
+        <a:effectLst/>
+      </c:spPr>
+      <c:txPr>
+        <a:bodyPr rot="0" spcFirstLastPara="1" vertOverflow="ellipsis" vert="horz" wrap="square" anchor="ctr" anchorCtr="1"/>
+        <a:lstStyle/>
+        <a:p>
+          <a:pPr>
+            <a:defRPr sz="1862" b="0" i="0" u="none" strike="noStrike" kern="1200" spc="0" baseline="0">
+              <a:solidFill>
+                <a:schemeClr val="tx1">
+                  <a:lumMod val="65000"/>
+                  <a:lumOff val="35000"/>
+                </a:schemeClr>
+              </a:solidFill>
+              <a:latin typeface="+mn-lt"/>
+              <a:ea typeface="+mn-ea"/>
+              <a:cs typeface="+mn-cs"/>
+            </a:defRPr>
+          </a:pPr>
+          <a:endParaRPr lang="en-US"/>
+        </a:p>
+      </c:txPr>
+    </c:title>
+    <c:autoTitleDeleted val="0"/>
+    <c:plotArea>
+      <c:layout/>
+      <c:pieChart>
+        <c:varyColors val="1"/>
+        <c:ser>
+          <c:idx val="0"/>
+          <c:order val="0"/>
+          <c:tx>
+            <c:strRef>
+              <c:f>Munka1!$B$1</c:f>
+              <c:strCache>
+                <c:ptCount val="1"/>
+                <c:pt idx="0">
+                  <c:v>Your bets</c:v>
+                </c:pt>
+              </c:strCache>
+            </c:strRef>
+          </c:tx>
+          <c:dPt>
+            <c:idx val="0"/>
+            <c:bubble3D val="0"/>
+            <c:spPr>
+              <a:solidFill>
+                <a:schemeClr val="accent1"/>
+              </a:solidFill>
+              <a:ln w="19050">
+                <a:solidFill>
+                  <a:schemeClr val="lt1"/>
+                </a:solidFill>
+              </a:ln>
+              <a:effectLst/>
+            </c:spPr>
+          </c:dPt>
+          <c:dPt>
+            <c:idx val="1"/>
+            <c:bubble3D val="0"/>
+            <c:spPr>
+              <a:solidFill>
+                <a:schemeClr val="accent2"/>
+              </a:solidFill>
+              <a:ln w="19050">
+                <a:solidFill>
+                  <a:schemeClr val="lt1"/>
+                </a:solidFill>
+              </a:ln>
+              <a:effectLst/>
+            </c:spPr>
+          </c:dPt>
+          <c:dPt>
+            <c:idx val="2"/>
+            <c:bubble3D val="0"/>
+            <c:spPr>
+              <a:solidFill>
+                <a:schemeClr val="accent3"/>
+              </a:solidFill>
+              <a:ln w="19050">
+                <a:solidFill>
+                  <a:schemeClr val="lt1"/>
+                </a:solidFill>
+              </a:ln>
+              <a:effectLst/>
+            </c:spPr>
+          </c:dPt>
+          <c:dPt>
+            <c:idx val="3"/>
+            <c:bubble3D val="0"/>
+            <c:spPr>
+              <a:solidFill>
+                <a:schemeClr val="accent4"/>
+              </a:solidFill>
+              <a:ln w="19050">
+                <a:solidFill>
+                  <a:schemeClr val="lt1"/>
+                </a:solidFill>
+              </a:ln>
+              <a:effectLst/>
+            </c:spPr>
+          </c:dPt>
+          <c:cat>
+            <c:strRef>
+              <c:f>Munka1!$A$2:$A$5</c:f>
+              <c:strCache>
+                <c:ptCount val="4"/>
+                <c:pt idx="0">
+                  <c:v>Won</c:v>
+                </c:pt>
+                <c:pt idx="1">
+                  <c:v>Lost</c:v>
+                </c:pt>
+                <c:pt idx="2">
+                  <c:v>In Progress</c:v>
+                </c:pt>
+                <c:pt idx="3">
+                  <c:v>Stopped</c:v>
+                </c:pt>
+              </c:strCache>
+            </c:strRef>
+          </c:cat>
+          <c:val>
+            <c:numRef>
+              <c:f>Munka1!$B$2:$B$5</c:f>
+              <c:numCache>
+                <c:formatCode>General</c:formatCode>
+                <c:ptCount val="4"/>
+                <c:pt idx="0">
+                  <c:v>10</c:v>
+                </c:pt>
+                <c:pt idx="1">
+                  <c:v>4</c:v>
+                </c:pt>
+                <c:pt idx="2">
+                  <c:v>25</c:v>
+                </c:pt>
+                <c:pt idx="3">
+                  <c:v>0</c:v>
+                </c:pt>
+              </c:numCache>
+            </c:numRef>
+          </c:val>
+          <c:extLst>
+            <c:ext xmlns:c16="http://schemas.microsoft.com/office/drawing/2014/chart" uri="{C3380CC4-5D6E-409C-BE32-E72D297353CC}">
+              <c16:uniqueId val="{00000000-B819-4B84-A66A-5DF92D0A8548}"/>
+            </c:ext>
+          </c:extLst>
+        </c:ser>
+        <c:dLbls>
+          <c:showLegendKey val="0"/>
+          <c:showVal val="0"/>
+          <c:showCatName val="0"/>
+          <c:showSerName val="0"/>
+          <c:showPercent val="0"/>
+          <c:showBubbleSize val="0"/>
+          <c:showLeaderLines val="1"/>
+        </c:dLbls>
+        <c:firstSliceAng val="0"/>
+      </c:pieChart>
+      <c:spPr>
+        <a:noFill/>
+        <a:ln>
+          <a:noFill/>
+        </a:ln>
+        <a:effectLst/>
+      </c:spPr>
+    </c:plotArea>
+    <c:legend>
+      <c:legendPos val="b"/>
+      <c:overlay val="0"/>
+      <c:spPr>
+        <a:noFill/>
+        <a:ln>
+          <a:noFill/>
+        </a:ln>
+        <a:effectLst/>
+      </c:spPr>
+      <c:txPr>
+        <a:bodyPr rot="0" spcFirstLastPara="1" vertOverflow="ellipsis" vert="horz" wrap="square" anchor="ctr" anchorCtr="1"/>
+        <a:lstStyle/>
+        <a:p>
+          <a:pPr>
+            <a:defRPr sz="1197" b="0" i="0" u="none" strike="noStrike" kern="1200" baseline="0">
+              <a:solidFill>
+                <a:schemeClr val="tx1">
+                  <a:lumMod val="65000"/>
+                  <a:lumOff val="35000"/>
+                </a:schemeClr>
+              </a:solidFill>
+              <a:latin typeface="+mn-lt"/>
+              <a:ea typeface="+mn-ea"/>
+              <a:cs typeface="+mn-cs"/>
+            </a:defRPr>
+          </a:pPr>
+          <a:endParaRPr lang="en-US"/>
+        </a:p>
+      </c:txPr>
+    </c:legend>
+    <c:plotVisOnly val="1"/>
+    <c:dispBlanksAs val="gap"/>
+    <c:extLst>
+      <c:ext xmlns:c16r3="http://schemas.microsoft.com/office/drawing/2017/03/chart" uri="{56B9EC1D-385E-4148-901F-78D8002777C0}">
+        <c16r3:dataDisplayOptions16>
+          <c16r3:dispNaAsBlank val="1"/>
+        </c16r3:dataDisplayOptions16>
+      </c:ext>
+    </c:extLst>
+    <c:showDLblsOverMax val="0"/>
+  </c:chart>
+  <c:spPr>
+    <a:solidFill>
+      <a:schemeClr val="bg1"/>
+    </a:solidFill>
+    <a:ln>
+      <a:noFill/>
+    </a:ln>
+    <a:effectLst/>
+  </c:spPr>
+  <c:txPr>
+    <a:bodyPr/>
+    <a:lstStyle/>
+    <a:p>
+      <a:pPr>
+        <a:defRPr/>
+      </a:pPr>
+      <a:endParaRPr lang="en-US"/>
+    </a:p>
+  </c:txPr>
+  <c:externalData r:id="rId3">
+    <c:autoUpdate val="0"/>
+  </c:externalData>
+</c:chartSpace>
+</file>
+
+<file path=ppt/charts/colors1.xml><?xml version="1.0" encoding="utf-8"?>
+<cs:colorStyle xmlns:cs="http://schemas.microsoft.com/office/drawing/2012/chartStyle" xmlns:a="http://schemas.openxmlformats.org/drawingml/2006/main" meth="cycle" id="10">
+  <a:schemeClr val="accent1"/>
+  <a:schemeClr val="accent2"/>
+  <a:schemeClr val="accent3"/>
+  <a:schemeClr val="accent4"/>
+  <a:schemeClr val="accent5"/>
+  <a:schemeClr val="accent6"/>
+  <cs:variation/>
+  <cs:variation>
+    <a:lumMod val="60000"/>
+  </cs:variation>
+  <cs:variation>
+    <a:lumMod val="80000"/>
+    <a:lumOff val="20000"/>
+  </cs:variation>
+  <cs:variation>
+    <a:lumMod val="80000"/>
+  </cs:variation>
+  <cs:variation>
+    <a:lumMod val="60000"/>
+    <a:lumOff val="40000"/>
+  </cs:variation>
+  <cs:variation>
+    <a:lumMod val="50000"/>
+  </cs:variation>
+  <cs:variation>
+    <a:lumMod val="70000"/>
+    <a:lumOff val="30000"/>
+  </cs:variation>
+  <cs:variation>
+    <a:lumMod val="70000"/>
+  </cs:variation>
+  <cs:variation>
+    <a:lumMod val="50000"/>
+    <a:lumOff val="50000"/>
+  </cs:variation>
+</cs:colorStyle>
+</file>
+
+<file path=ppt/charts/style1.xml><?xml version="1.0" encoding="utf-8"?>
+<cs:chartStyle xmlns:cs="http://schemas.microsoft.com/office/drawing/2012/chartStyle" xmlns:a="http://schemas.openxmlformats.org/drawingml/2006/main" id="251">
+  <cs:axisTitle>
+    <cs:lnRef idx="0"/>
+    <cs:fillRef idx="0"/>
+    <cs:effectRef idx="0"/>
+    <cs:fontRef idx="minor">
+      <a:schemeClr val="tx1">
+        <a:lumMod val="65000"/>
+        <a:lumOff val="35000"/>
+      </a:schemeClr>
+    </cs:fontRef>
+    <cs:defRPr sz="1330" kern="1200"/>
+  </cs:axisTitle>
+  <cs:categoryAxis>
+    <cs:lnRef idx="0"/>
+    <cs:fillRef idx="0"/>
+    <cs:effectRef idx="0"/>
+    <cs:fontRef idx="minor">
+      <a:schemeClr val="tx1">
+        <a:lumMod val="65000"/>
+        <a:lumOff val="35000"/>
+      </a:schemeClr>
+    </cs:fontRef>
+    <cs:spPr>
+      <a:ln w="9525" cap="flat" cmpd="sng" algn="ctr">
+        <a:solidFill>
+          <a:schemeClr val="tx1">
+            <a:lumMod val="15000"/>
+            <a:lumOff val="85000"/>
+          </a:schemeClr>
+        </a:solidFill>
+        <a:round/>
+      </a:ln>
+    </cs:spPr>
+    <cs:defRPr sz="1197" kern="1200"/>
+  </cs:categoryAxis>
+  <cs:chartArea mods="allowNoFillOverride allowNoLineOverride">
+    <cs:lnRef idx="0"/>
+    <cs:fillRef idx="0"/>
+    <cs:effectRef idx="0"/>
+    <cs:fontRef idx="minor">
+      <a:schemeClr val="tx1"/>
+    </cs:fontRef>
+    <cs:spPr>
+      <a:solidFill>
+        <a:schemeClr val="bg1"/>
+      </a:solidFill>
+      <a:ln w="9525" cap="flat" cmpd="sng" algn="ctr">
+        <a:solidFill>
+          <a:schemeClr val="tx1">
+            <a:lumMod val="15000"/>
+            <a:lumOff val="85000"/>
+          </a:schemeClr>
+        </a:solidFill>
+        <a:round/>
+      </a:ln>
+    </cs:spPr>
+    <cs:defRPr sz="1197" kern="1200"/>
+  </cs:chartArea>
+  <cs:dataLabel>
+    <cs:lnRef idx="0"/>
+    <cs:fillRef idx="0"/>
+    <cs:effectRef idx="0"/>
+    <cs:fontRef idx="minor">
+      <a:schemeClr val="tx1">
+        <a:lumMod val="75000"/>
+        <a:lumOff val="25000"/>
+      </a:schemeClr>
+    </cs:fontRef>
+    <cs:defRPr sz="1197" kern="1200"/>
+  </cs:dataLabel>
+  <cs:dataLabelCallout>
+    <cs:lnRef idx="0"/>
+    <cs:fillRef idx="0"/>
+    <cs:effectRef idx="0"/>
+    <cs:fontRef idx="minor">
+      <a:schemeClr val="dk1">
+        <a:lumMod val="65000"/>
+        <a:lumOff val="35000"/>
+      </a:schemeClr>
+    </cs:fontRef>
+    <cs:spPr>
+      <a:solidFill>
+        <a:schemeClr val="lt1"/>
+      </a:solidFill>
+      <a:ln>
+        <a:solidFill>
+          <a:schemeClr val="dk1">
+            <a:lumMod val="25000"/>
+            <a:lumOff val="75000"/>
+          </a:schemeClr>
+        </a:solidFill>
+      </a:ln>
+    </cs:spPr>
+    <cs:defRPr sz="1197" kern="1200"/>
+    <cs:bodyPr rot="0" spcFirstLastPara="1" vertOverflow="clip" horzOverflow="clip" vert="horz" wrap="square" lIns="36576" tIns="18288" rIns="36576" bIns="18288" anchor="ctr" anchorCtr="1">
+      <a:spAutoFit/>
+    </cs:bodyPr>
+  </cs:dataLabelCallout>
+  <cs:dataPoint>
+    <cs:lnRef idx="0"/>
+    <cs:fillRef idx="1">
+      <cs:styleClr val="auto"/>
+    </cs:fillRef>
+    <cs:effectRef idx="0"/>
+    <cs:fontRef idx="minor">
+      <a:schemeClr val="tx1"/>
+    </cs:fontRef>
+    <cs:spPr>
+      <a:ln w="19050">
+        <a:solidFill>
+          <a:schemeClr val="lt1"/>
+        </a:solidFill>
+      </a:ln>
+    </cs:spPr>
+  </cs:dataPoint>
+  <cs:dataPoint3D>
+    <cs:lnRef idx="0"/>
+    <cs:fillRef idx="1">
+      <cs:styleClr val="auto"/>
+    </cs:fillRef>
+    <cs:effectRef idx="0"/>
+    <cs:fontRef idx="minor">
+      <a:schemeClr val="tx1"/>
+    </cs:fontRef>
+    <cs:spPr>
+      <a:ln w="25400">
+        <a:solidFill>
+          <a:schemeClr val="lt1"/>
+        </a:solidFill>
+      </a:ln>
+    </cs:spPr>
+  </cs:dataPoint3D>
+  <cs:dataPointLine>
+    <cs:lnRef idx="0">
+      <cs:styleClr val="auto"/>
+    </cs:lnRef>
+    <cs:fillRef idx="0"/>
+    <cs:effectRef idx="0"/>
+    <cs:fontRef idx="minor">
+      <a:schemeClr val="tx1"/>
+    </cs:fontRef>
+    <cs:spPr>
+      <a:ln w="28575" cap="rnd">
+        <a:solidFill>
+          <a:schemeClr val="phClr"/>
+        </a:solidFill>
+        <a:round/>
+      </a:ln>
+    </cs:spPr>
+  </cs:dataPointLine>
+  <cs:dataPointMarker>
+    <cs:lnRef idx="0">
+      <cs:styleClr val="auto"/>
+    </cs:lnRef>
+    <cs:fillRef idx="1">
+      <cs:styleClr val="auto"/>
+    </cs:fillRef>
+    <cs:effectRef idx="0"/>
+    <cs:fontRef idx="minor">
+      <a:schemeClr val="tx1"/>
+    </cs:fontRef>
+    <cs:spPr>
+      <a:ln w="9525">
+        <a:solidFill>
+          <a:schemeClr val="phClr"/>
+        </a:solidFill>
+      </a:ln>
+    </cs:spPr>
+  </cs:dataPointMarker>
+  <cs:dataPointMarkerLayout symbol="circle" size="5"/>
+  <cs:dataPointWireframe>
+    <cs:lnRef idx="0">
+      <cs:styleClr val="auto"/>
+    </cs:lnRef>
+    <cs:fillRef idx="0"/>
+    <cs:effectRef idx="0"/>
+    <cs:fontRef idx="minor">
+      <a:schemeClr val="tx1"/>
+    </cs:fontRef>
+    <cs:spPr>
+      <a:ln w="9525" cap="rnd">
+        <a:solidFill>
+          <a:schemeClr val="phClr"/>
+        </a:solidFill>
+        <a:round/>
+      </a:ln>
+    </cs:spPr>
+  </cs:dataPointWireframe>
+  <cs:dataTable>
+    <cs:lnRef idx="0"/>
+    <cs:fillRef idx="0"/>
+    <cs:effectRef idx="0"/>
+    <cs:fontRef idx="minor">
+      <a:schemeClr val="tx1">
+        <a:lumMod val="65000"/>
+        <a:lumOff val="35000"/>
+      </a:schemeClr>
+    </cs:fontRef>
+    <cs:spPr>
+      <a:noFill/>
+      <a:ln w="9525" cap="flat" cmpd="sng" algn="ctr">
+        <a:solidFill>
+          <a:schemeClr val="tx1">
+            <a:lumMod val="15000"/>
+            <a:lumOff val="85000"/>
+          </a:schemeClr>
+        </a:solidFill>
+        <a:round/>
+      </a:ln>
+    </cs:spPr>
+    <cs:defRPr sz="1197" kern="1200"/>
+  </cs:dataTable>
+  <cs:downBar>
+    <cs:lnRef idx="0"/>
+    <cs:fillRef idx="0"/>
+    <cs:effectRef idx="0"/>
+    <cs:fontRef idx="minor">
+      <a:schemeClr val="tx1"/>
+    </cs:fontRef>
+    <cs:spPr>
+      <a:solidFill>
+        <a:schemeClr val="dk1">
+          <a:lumMod val="75000"/>
+          <a:lumOff val="25000"/>
+        </a:schemeClr>
+      </a:solidFill>
+      <a:ln w="9525" cap="flat" cmpd="sng" algn="ctr">
+        <a:solidFill>
+          <a:schemeClr val="tx1">
+            <a:lumMod val="65000"/>
+            <a:lumOff val="35000"/>
+          </a:schemeClr>
+        </a:solidFill>
+        <a:round/>
+      </a:ln>
+    </cs:spPr>
+  </cs:downBar>
+  <cs:dropLine>
+    <cs:lnRef idx="0"/>
+    <cs:fillRef idx="0"/>
+    <cs:effectRef idx="0"/>
+    <cs:fontRef idx="minor">
+      <a:schemeClr val="tx1"/>
+    </cs:fontRef>
+    <cs:spPr>
+      <a:ln w="9525" cap="flat" cmpd="sng" algn="ctr">
+        <a:solidFill>
+          <a:schemeClr val="tx1">
+            <a:lumMod val="35000"/>
+            <a:lumOff val="65000"/>
+          </a:schemeClr>
+        </a:solidFill>
+        <a:round/>
+      </a:ln>
+    </cs:spPr>
+  </cs:dropLine>
+  <cs:errorBar>
+    <cs:lnRef idx="0"/>
+    <cs:fillRef idx="0"/>
+    <cs:effectRef idx="0"/>
+    <cs:fontRef idx="minor">
+      <a:schemeClr val="tx1"/>
+    </cs:fontRef>
+    <cs:spPr>
+      <a:ln w="9525" cap="flat" cmpd="sng" algn="ctr">
+        <a:solidFill>
+          <a:schemeClr val="tx1">
+            <a:lumMod val="65000"/>
+            <a:lumOff val="35000"/>
+          </a:schemeClr>
+        </a:solidFill>
+        <a:round/>
+      </a:ln>
+    </cs:spPr>
+  </cs:errorBar>
+  <cs:floor>
+    <cs:lnRef idx="0"/>
+    <cs:fillRef idx="0"/>
+    <cs:effectRef idx="0"/>
+    <cs:fontRef idx="minor">
+      <a:schemeClr val="tx1"/>
+    </cs:fontRef>
+    <cs:spPr>
+      <a:noFill/>
+      <a:ln>
+        <a:noFill/>
+      </a:ln>
+    </cs:spPr>
+  </cs:floor>
+  <cs:gridlineMajor>
+    <cs:lnRef idx="0"/>
+    <cs:fillRef idx="0"/>
+    <cs:effectRef idx="0"/>
+    <cs:fontRef idx="minor">
+      <a:schemeClr val="tx1"/>
+    </cs:fontRef>
+    <cs:spPr>
+      <a:ln w="9525" cap="flat" cmpd="sng" algn="ctr">
+        <a:solidFill>
+          <a:schemeClr val="tx1">
+            <a:lumMod val="15000"/>
+            <a:lumOff val="85000"/>
+          </a:schemeClr>
+        </a:solidFill>
+        <a:round/>
+      </a:ln>
+    </cs:spPr>
+  </cs:gridlineMajor>
+  <cs:gridlineMinor>
+    <cs:lnRef idx="0"/>
+    <cs:fillRef idx="0"/>
+    <cs:effectRef idx="0"/>
+    <cs:fontRef idx="minor">
+      <a:schemeClr val="tx1"/>
+    </cs:fontRef>
+    <cs:spPr>
+      <a:ln w="9525" cap="flat" cmpd="sng" algn="ctr">
+        <a:solidFill>
+          <a:schemeClr val="tx1">
+            <a:lumMod val="5000"/>
+            <a:lumOff val="95000"/>
+          </a:schemeClr>
+        </a:solidFill>
+        <a:round/>
+      </a:ln>
+    </cs:spPr>
+  </cs:gridlineMinor>
+  <cs:hiLoLine>
+    <cs:lnRef idx="0"/>
+    <cs:fillRef idx="0"/>
+    <cs:effectRef idx="0"/>
+    <cs:fontRef idx="minor">
+      <a:schemeClr val="tx1"/>
+    </cs:fontRef>
+    <cs:spPr>
+      <a:ln w="9525" cap="flat" cmpd="sng" algn="ctr">
+        <a:solidFill>
+          <a:schemeClr val="tx1">
+            <a:lumMod val="50000"/>
+            <a:lumOff val="50000"/>
+          </a:schemeClr>
+        </a:solidFill>
+        <a:round/>
+      </a:ln>
+    </cs:spPr>
+  </cs:hiLoLine>
+  <cs:leaderLine>
+    <cs:lnRef idx="0"/>
+    <cs:fillRef idx="0"/>
+    <cs:effectRef idx="0"/>
+    <cs:fontRef idx="minor">
+      <a:schemeClr val="tx1"/>
+    </cs:fontRef>
+    <cs:spPr>
+      <a:ln w="9525" cap="flat" cmpd="sng" algn="ctr">
+        <a:solidFill>
+          <a:schemeClr val="tx1">
+            <a:lumMod val="35000"/>
+            <a:lumOff val="65000"/>
+          </a:schemeClr>
+        </a:solidFill>
+        <a:round/>
+      </a:ln>
+    </cs:spPr>
+  </cs:leaderLine>
+  <cs:legend>
+    <cs:lnRef idx="0"/>
+    <cs:fillRef idx="0"/>
+    <cs:effectRef idx="0"/>
+    <cs:fontRef idx="minor">
+      <a:schemeClr val="tx1">
+        <a:lumMod val="65000"/>
+        <a:lumOff val="35000"/>
+      </a:schemeClr>
+    </cs:fontRef>
+    <cs:defRPr sz="1197" kern="1200"/>
+  </cs:legend>
+  <cs:plotArea mods="allowNoFillOverride allowNoLineOverride">
+    <cs:lnRef idx="0"/>
+    <cs:fillRef idx="0"/>
+    <cs:effectRef idx="0"/>
+    <cs:fontRef idx="minor">
+      <a:schemeClr val="tx1"/>
+    </cs:fontRef>
+  </cs:plotArea>
+  <cs:plotArea3D mods="allowNoFillOverride allowNoLineOverride">
+    <cs:lnRef idx="0"/>
+    <cs:fillRef idx="0"/>
+    <cs:effectRef idx="0"/>
+    <cs:fontRef idx="minor">
+      <a:schemeClr val="tx1"/>
+    </cs:fontRef>
+  </cs:plotArea3D>
+  <cs:seriesAxis>
+    <cs:lnRef idx="0"/>
+    <cs:fillRef idx="0"/>
+    <cs:effectRef idx="0"/>
+    <cs:fontRef idx="minor">
+      <a:schemeClr val="tx1">
+        <a:lumMod val="65000"/>
+        <a:lumOff val="35000"/>
+      </a:schemeClr>
+    </cs:fontRef>
+    <cs:defRPr sz="1197" kern="1200"/>
+  </cs:seriesAxis>
+  <cs:seriesLine>
+    <cs:lnRef idx="0"/>
+    <cs:fillRef idx="0"/>
+    <cs:effectRef idx="0"/>
+    <cs:fontRef idx="minor">
+      <a:schemeClr val="tx1"/>
+    </cs:fontRef>
+    <cs:spPr>
+      <a:ln w="9525" cap="flat" cmpd="sng" algn="ctr">
+        <a:solidFill>
+          <a:schemeClr val="tx1">
+            <a:lumMod val="35000"/>
+            <a:lumOff val="65000"/>
+          </a:schemeClr>
+        </a:solidFill>
+        <a:round/>
+      </a:ln>
+    </cs:spPr>
+  </cs:seriesLine>
+  <cs:title>
+    <cs:lnRef idx="0"/>
+    <cs:fillRef idx="0"/>
+    <cs:effectRef idx="0"/>
+    <cs:fontRef idx="minor">
+      <a:schemeClr val="tx1">
+        <a:lumMod val="65000"/>
+        <a:lumOff val="35000"/>
+      </a:schemeClr>
+    </cs:fontRef>
+    <cs:defRPr sz="1862" b="0" kern="1200" spc="0" baseline="0"/>
+  </cs:title>
+  <cs:trendline>
+    <cs:lnRef idx="0">
+      <cs:styleClr val="auto"/>
+    </cs:lnRef>
+    <cs:fillRef idx="0"/>
+    <cs:effectRef idx="0"/>
+    <cs:fontRef idx="minor">
+      <a:schemeClr val="tx1"/>
+    </cs:fontRef>
+    <cs:spPr>
+      <a:ln w="19050" cap="rnd">
+        <a:solidFill>
+          <a:schemeClr val="phClr"/>
+        </a:solidFill>
+        <a:prstDash val="sysDot"/>
+      </a:ln>
+    </cs:spPr>
+  </cs:trendline>
+  <cs:trendlineLabel>
+    <cs:lnRef idx="0"/>
+    <cs:fillRef idx="0"/>
+    <cs:effectRef idx="0"/>
+    <cs:fontRef idx="minor">
+      <a:schemeClr val="tx1">
+        <a:lumMod val="65000"/>
+        <a:lumOff val="35000"/>
+      </a:schemeClr>
+    </cs:fontRef>
+    <cs:defRPr sz="1197" kern="1200"/>
+  </cs:trendlineLabel>
+  <cs:upBar>
+    <cs:lnRef idx="0"/>
+    <cs:fillRef idx="0"/>
+    <cs:effectRef idx="0"/>
+    <cs:fontRef idx="minor">
+      <a:schemeClr val="tx1"/>
+    </cs:fontRef>
+    <cs:spPr>
+      <a:solidFill>
+        <a:schemeClr val="lt1"/>
+      </a:solidFill>
+      <a:ln w="9525" cap="flat" cmpd="sng" algn="ctr">
+        <a:solidFill>
+          <a:schemeClr val="tx1">
+            <a:lumMod val="65000"/>
+            <a:lumOff val="35000"/>
+          </a:schemeClr>
+        </a:solidFill>
+        <a:round/>
+      </a:ln>
+    </cs:spPr>
+  </cs:upBar>
+  <cs:valueAxis>
+    <cs:lnRef idx="0"/>
+    <cs:fillRef idx="0"/>
+    <cs:effectRef idx="0"/>
+    <cs:fontRef idx="minor">
+      <a:schemeClr val="tx1">
+        <a:lumMod val="65000"/>
+        <a:lumOff val="35000"/>
+      </a:schemeClr>
+    </cs:fontRef>
+    <cs:defRPr sz="1197" kern="1200"/>
+  </cs:valueAxis>
+  <cs:wall>
+    <cs:lnRef idx="0"/>
+    <cs:fillRef idx="0"/>
+    <cs:effectRef idx="0"/>
+    <cs:fontRef idx="minor">
+      <a:schemeClr val="tx1"/>
+    </cs:fontRef>
+    <cs:spPr>
+      <a:noFill/>
+      <a:ln>
+        <a:noFill/>
+      </a:ln>
+    </cs:spPr>
+  </cs:wall>
+</cs:chartStyle>
 </file>
 
 <file path=ppt/slideLayouts/slideLayout1.xml><?xml version="1.0" encoding="utf-8"?>
@@ -131,7 +954,7 @@
           <p:cNvPr id="2" name="Cím 1">
             <a:extLst>
               <a:ext uri="{FF2B5EF4-FFF2-40B4-BE49-F238E27FC236}">
-                <a16:creationId xmlns:a16="http://schemas.microsoft.com/office/drawing/2014/main" id="{8B3E09A3-0BB1-4120-A1F7-07144A2201AF}"/>
+                <a16:creationId xmlns:a16="http://schemas.microsoft.com/office/drawing/2014/main" id="{821E192B-1AB8-4C60-BBC5-551947B402A9}"/>
               </a:ext>
             </a:extLst>
           </p:cNvPr>
@@ -169,7 +992,7 @@
           <p:cNvPr id="3" name="Alcím 2">
             <a:extLst>
               <a:ext uri="{FF2B5EF4-FFF2-40B4-BE49-F238E27FC236}">
-                <a16:creationId xmlns:a16="http://schemas.microsoft.com/office/drawing/2014/main" id="{72DFC06B-FBBA-4B1F-B767-7319779F5A8A}"/>
+                <a16:creationId xmlns:a16="http://schemas.microsoft.com/office/drawing/2014/main" id="{FFD808E3-4786-420F-B913-DC7E05BE9C30}"/>
               </a:ext>
             </a:extLst>
           </p:cNvPr>
@@ -240,7 +1063,7 @@
           <p:cNvPr id="4" name="Dátum helye 3">
             <a:extLst>
               <a:ext uri="{FF2B5EF4-FFF2-40B4-BE49-F238E27FC236}">
-                <a16:creationId xmlns:a16="http://schemas.microsoft.com/office/drawing/2014/main" id="{ED2A352E-7197-4A5E-B853-5DA13EB5C2AB}"/>
+                <a16:creationId xmlns:a16="http://schemas.microsoft.com/office/drawing/2014/main" id="{FD15FF13-79F1-4EDB-A880-BE74C7F7D906}"/>
               </a:ext>
             </a:extLst>
           </p:cNvPr>
@@ -258,7 +1081,7 @@
           <a:p>
             <a:fld id="{B4742013-0DAB-4454-B6F3-6E5941F77519}" type="datetimeFigureOut">
               <a:rPr lang="en-US" smtClean="0"/>
-              <a:t>11/23/2020</a:t>
+              <a:t>11/26/2020</a:t>
             </a:fld>
             <a:endParaRPr lang="en-US"/>
           </a:p>
@@ -269,7 +1092,7 @@
           <p:cNvPr id="5" name="Élőláb helye 4">
             <a:extLst>
               <a:ext uri="{FF2B5EF4-FFF2-40B4-BE49-F238E27FC236}">
-                <a16:creationId xmlns:a16="http://schemas.microsoft.com/office/drawing/2014/main" id="{B0DA7B11-4D21-4259-BACE-4EFEF0990345}"/>
+                <a16:creationId xmlns:a16="http://schemas.microsoft.com/office/drawing/2014/main" id="{34F331BE-1ACF-4C92-9DC0-7C265757D4B1}"/>
               </a:ext>
             </a:extLst>
           </p:cNvPr>
@@ -294,7 +1117,7 @@
           <p:cNvPr id="6" name="Dia számának helye 5">
             <a:extLst>
               <a:ext uri="{FF2B5EF4-FFF2-40B4-BE49-F238E27FC236}">
-                <a16:creationId xmlns:a16="http://schemas.microsoft.com/office/drawing/2014/main" id="{A4F74935-5F4F-4CE0-B037-003E267EF015}"/>
+                <a16:creationId xmlns:a16="http://schemas.microsoft.com/office/drawing/2014/main" id="{80693B5B-B09F-42B2-B7BD-CD0E37754118}"/>
               </a:ext>
             </a:extLst>
           </p:cNvPr>
@@ -321,7 +1144,7 @@
     </p:spTree>
     <p:extLst>
       <p:ext uri="{BB962C8B-B14F-4D97-AF65-F5344CB8AC3E}">
-        <p14:creationId xmlns:p14="http://schemas.microsoft.com/office/powerpoint/2010/main" val="3846918470"/>
+        <p14:creationId xmlns:p14="http://schemas.microsoft.com/office/powerpoint/2010/main" val="3142337105"/>
       </p:ext>
     </p:extLst>
   </p:cSld>
@@ -353,7 +1176,7 @@
           <p:cNvPr id="2" name="Cím 1">
             <a:extLst>
               <a:ext uri="{FF2B5EF4-FFF2-40B4-BE49-F238E27FC236}">
-                <a16:creationId xmlns:a16="http://schemas.microsoft.com/office/drawing/2014/main" id="{3ED91521-1291-48EC-A793-7E8BB35D330C}"/>
+                <a16:creationId xmlns:a16="http://schemas.microsoft.com/office/drawing/2014/main" id="{0669BB76-8916-4235-886A-E1D8E273311C}"/>
               </a:ext>
             </a:extLst>
           </p:cNvPr>
@@ -382,7 +1205,7 @@
           <p:cNvPr id="3" name="Függőleges szöveg helye 2">
             <a:extLst>
               <a:ext uri="{FF2B5EF4-FFF2-40B4-BE49-F238E27FC236}">
-                <a16:creationId xmlns:a16="http://schemas.microsoft.com/office/drawing/2014/main" id="{6AD2A4D5-9934-41B8-BE05-48DC5B0A1A02}"/>
+                <a16:creationId xmlns:a16="http://schemas.microsoft.com/office/drawing/2014/main" id="{2C992EB2-1275-4065-AE1D-621578E466E1}"/>
               </a:ext>
             </a:extLst>
           </p:cNvPr>
@@ -440,7 +1263,7 @@
           <p:cNvPr id="4" name="Dátum helye 3">
             <a:extLst>
               <a:ext uri="{FF2B5EF4-FFF2-40B4-BE49-F238E27FC236}">
-                <a16:creationId xmlns:a16="http://schemas.microsoft.com/office/drawing/2014/main" id="{02C7C088-9EA7-439C-993D-E9FEED742C5A}"/>
+                <a16:creationId xmlns:a16="http://schemas.microsoft.com/office/drawing/2014/main" id="{B0E6CE4C-A2B3-47E0-8B22-73CAD9AA48B7}"/>
               </a:ext>
             </a:extLst>
           </p:cNvPr>
@@ -458,7 +1281,7 @@
           <a:p>
             <a:fld id="{B4742013-0DAB-4454-B6F3-6E5941F77519}" type="datetimeFigureOut">
               <a:rPr lang="en-US" smtClean="0"/>
-              <a:t>11/23/2020</a:t>
+              <a:t>11/26/2020</a:t>
             </a:fld>
             <a:endParaRPr lang="en-US"/>
           </a:p>
@@ -469,7 +1292,7 @@
           <p:cNvPr id="5" name="Élőláb helye 4">
             <a:extLst>
               <a:ext uri="{FF2B5EF4-FFF2-40B4-BE49-F238E27FC236}">
-                <a16:creationId xmlns:a16="http://schemas.microsoft.com/office/drawing/2014/main" id="{99FD3EF5-8186-40C5-BD84-8053FDC553D8}"/>
+                <a16:creationId xmlns:a16="http://schemas.microsoft.com/office/drawing/2014/main" id="{B66AB35F-61B8-4CA6-B501-A7C8C4EEDB5A}"/>
               </a:ext>
             </a:extLst>
           </p:cNvPr>
@@ -494,7 +1317,7 @@
           <p:cNvPr id="6" name="Dia számának helye 5">
             <a:extLst>
               <a:ext uri="{FF2B5EF4-FFF2-40B4-BE49-F238E27FC236}">
-                <a16:creationId xmlns:a16="http://schemas.microsoft.com/office/drawing/2014/main" id="{20660297-8649-4AC4-ACBD-8DF2F9B2727C}"/>
+                <a16:creationId xmlns:a16="http://schemas.microsoft.com/office/drawing/2014/main" id="{B77657F0-87CF-4B0B-B32B-A1E2CF13C6EB}"/>
               </a:ext>
             </a:extLst>
           </p:cNvPr>
@@ -521,7 +1344,7 @@
     </p:spTree>
     <p:extLst>
       <p:ext uri="{BB962C8B-B14F-4D97-AF65-F5344CB8AC3E}">
-        <p14:creationId xmlns:p14="http://schemas.microsoft.com/office/powerpoint/2010/main" val="1275213671"/>
+        <p14:creationId xmlns:p14="http://schemas.microsoft.com/office/powerpoint/2010/main" val="4069787250"/>
       </p:ext>
     </p:extLst>
   </p:cSld>
@@ -553,7 +1376,7 @@
           <p:cNvPr id="2" name="Függőleges cím 1">
             <a:extLst>
               <a:ext uri="{FF2B5EF4-FFF2-40B4-BE49-F238E27FC236}">
-                <a16:creationId xmlns:a16="http://schemas.microsoft.com/office/drawing/2014/main" id="{77757A85-B39B-43AC-974B-9AEFB0AD4041}"/>
+                <a16:creationId xmlns:a16="http://schemas.microsoft.com/office/drawing/2014/main" id="{0F02AB52-2E9B-49FB-972A-71354344F695}"/>
               </a:ext>
             </a:extLst>
           </p:cNvPr>
@@ -587,7 +1410,7 @@
           <p:cNvPr id="3" name="Függőleges szöveg helye 2">
             <a:extLst>
               <a:ext uri="{FF2B5EF4-FFF2-40B4-BE49-F238E27FC236}">
-                <a16:creationId xmlns:a16="http://schemas.microsoft.com/office/drawing/2014/main" id="{1E29EFF2-B7DF-48F8-A95E-94648BD0799C}"/>
+                <a16:creationId xmlns:a16="http://schemas.microsoft.com/office/drawing/2014/main" id="{871E830E-D907-4448-991F-37A308960AA7}"/>
               </a:ext>
             </a:extLst>
           </p:cNvPr>
@@ -650,7 +1473,7 @@
           <p:cNvPr id="4" name="Dátum helye 3">
             <a:extLst>
               <a:ext uri="{FF2B5EF4-FFF2-40B4-BE49-F238E27FC236}">
-                <a16:creationId xmlns:a16="http://schemas.microsoft.com/office/drawing/2014/main" id="{60931492-8E26-438B-94A4-1A3401DCF124}"/>
+                <a16:creationId xmlns:a16="http://schemas.microsoft.com/office/drawing/2014/main" id="{F8AC2F66-F561-4FA1-BDD6-D49E4B83995B}"/>
               </a:ext>
             </a:extLst>
           </p:cNvPr>
@@ -668,7 +1491,7 @@
           <a:p>
             <a:fld id="{B4742013-0DAB-4454-B6F3-6E5941F77519}" type="datetimeFigureOut">
               <a:rPr lang="en-US" smtClean="0"/>
-              <a:t>11/23/2020</a:t>
+              <a:t>11/26/2020</a:t>
             </a:fld>
             <a:endParaRPr lang="en-US"/>
           </a:p>
@@ -679,7 +1502,7 @@
           <p:cNvPr id="5" name="Élőláb helye 4">
             <a:extLst>
               <a:ext uri="{FF2B5EF4-FFF2-40B4-BE49-F238E27FC236}">
-                <a16:creationId xmlns:a16="http://schemas.microsoft.com/office/drawing/2014/main" id="{265CFDBB-DFF9-40E0-941D-5DD4274B07E5}"/>
+                <a16:creationId xmlns:a16="http://schemas.microsoft.com/office/drawing/2014/main" id="{8C92495F-B2AA-4D9D-A749-3FC12706A8EC}"/>
               </a:ext>
             </a:extLst>
           </p:cNvPr>
@@ -704,7 +1527,7 @@
           <p:cNvPr id="6" name="Dia számának helye 5">
             <a:extLst>
               <a:ext uri="{FF2B5EF4-FFF2-40B4-BE49-F238E27FC236}">
-                <a16:creationId xmlns:a16="http://schemas.microsoft.com/office/drawing/2014/main" id="{C3685608-2952-4C4D-AFE6-A60716186446}"/>
+                <a16:creationId xmlns:a16="http://schemas.microsoft.com/office/drawing/2014/main" id="{38E9B9AC-52E0-4EFE-9E2B-A7197677E63A}"/>
               </a:ext>
             </a:extLst>
           </p:cNvPr>
@@ -731,7 +1554,7 @@
     </p:spTree>
     <p:extLst>
       <p:ext uri="{BB962C8B-B14F-4D97-AF65-F5344CB8AC3E}">
-        <p14:creationId xmlns:p14="http://schemas.microsoft.com/office/powerpoint/2010/main" val="3875870891"/>
+        <p14:creationId xmlns:p14="http://schemas.microsoft.com/office/powerpoint/2010/main" val="2236662394"/>
       </p:ext>
     </p:extLst>
   </p:cSld>
@@ -763,7 +1586,7 @@
           <p:cNvPr id="2" name="Cím 1">
             <a:extLst>
               <a:ext uri="{FF2B5EF4-FFF2-40B4-BE49-F238E27FC236}">
-                <a16:creationId xmlns:a16="http://schemas.microsoft.com/office/drawing/2014/main" id="{9A9D9AFC-1889-4F43-B35B-14E9628F237D}"/>
+                <a16:creationId xmlns:a16="http://schemas.microsoft.com/office/drawing/2014/main" id="{960D56D6-0DE8-49E3-A2FF-4E4CEDAB7C44}"/>
               </a:ext>
             </a:extLst>
           </p:cNvPr>
@@ -792,7 +1615,7 @@
           <p:cNvPr id="3" name="Tartalom helye 2">
             <a:extLst>
               <a:ext uri="{FF2B5EF4-FFF2-40B4-BE49-F238E27FC236}">
-                <a16:creationId xmlns:a16="http://schemas.microsoft.com/office/drawing/2014/main" id="{AD86158F-787D-40E0-B405-CDA189020783}"/>
+                <a16:creationId xmlns:a16="http://schemas.microsoft.com/office/drawing/2014/main" id="{EB6AC4F3-1032-4C54-BD91-D2246BC61DBA}"/>
               </a:ext>
             </a:extLst>
           </p:cNvPr>
@@ -850,7 +1673,7 @@
           <p:cNvPr id="4" name="Dátum helye 3">
             <a:extLst>
               <a:ext uri="{FF2B5EF4-FFF2-40B4-BE49-F238E27FC236}">
-                <a16:creationId xmlns:a16="http://schemas.microsoft.com/office/drawing/2014/main" id="{7A6BEBE8-5C54-4E33-B7D4-33EA0CCF32E1}"/>
+                <a16:creationId xmlns:a16="http://schemas.microsoft.com/office/drawing/2014/main" id="{D2678F90-9C45-4746-A575-FC020A92BA3F}"/>
               </a:ext>
             </a:extLst>
           </p:cNvPr>
@@ -868,7 +1691,7 @@
           <a:p>
             <a:fld id="{B4742013-0DAB-4454-B6F3-6E5941F77519}" type="datetimeFigureOut">
               <a:rPr lang="en-US" smtClean="0"/>
-              <a:t>11/23/2020</a:t>
+              <a:t>11/26/2020</a:t>
             </a:fld>
             <a:endParaRPr lang="en-US"/>
           </a:p>
@@ -879,7 +1702,7 @@
           <p:cNvPr id="5" name="Élőláb helye 4">
             <a:extLst>
               <a:ext uri="{FF2B5EF4-FFF2-40B4-BE49-F238E27FC236}">
-                <a16:creationId xmlns:a16="http://schemas.microsoft.com/office/drawing/2014/main" id="{4EE2493C-1622-44FC-9999-B2F47E6872E4}"/>
+                <a16:creationId xmlns:a16="http://schemas.microsoft.com/office/drawing/2014/main" id="{896C5841-8841-4896-8B2A-C6FDBC533131}"/>
               </a:ext>
             </a:extLst>
           </p:cNvPr>
@@ -904,7 +1727,7 @@
           <p:cNvPr id="6" name="Dia számának helye 5">
             <a:extLst>
               <a:ext uri="{FF2B5EF4-FFF2-40B4-BE49-F238E27FC236}">
-                <a16:creationId xmlns:a16="http://schemas.microsoft.com/office/drawing/2014/main" id="{E3D630FC-A3E1-4E95-9F3F-F857196325F2}"/>
+                <a16:creationId xmlns:a16="http://schemas.microsoft.com/office/drawing/2014/main" id="{ED69138D-5FBD-425B-AE8B-2A6C0C275316}"/>
               </a:ext>
             </a:extLst>
           </p:cNvPr>
@@ -931,7 +1754,7 @@
     </p:spTree>
     <p:extLst>
       <p:ext uri="{BB962C8B-B14F-4D97-AF65-F5344CB8AC3E}">
-        <p14:creationId xmlns:p14="http://schemas.microsoft.com/office/powerpoint/2010/main" val="1519731250"/>
+        <p14:creationId xmlns:p14="http://schemas.microsoft.com/office/powerpoint/2010/main" val="3952575904"/>
       </p:ext>
     </p:extLst>
   </p:cSld>
@@ -963,7 +1786,7 @@
           <p:cNvPr id="2" name="Cím 1">
             <a:extLst>
               <a:ext uri="{FF2B5EF4-FFF2-40B4-BE49-F238E27FC236}">
-                <a16:creationId xmlns:a16="http://schemas.microsoft.com/office/drawing/2014/main" id="{55289324-DD5B-44A5-87FC-A207E348B98C}"/>
+                <a16:creationId xmlns:a16="http://schemas.microsoft.com/office/drawing/2014/main" id="{4C198D2D-F686-4F2C-A0B0-F7BD465F4BDD}"/>
               </a:ext>
             </a:extLst>
           </p:cNvPr>
@@ -1001,7 +1824,7 @@
           <p:cNvPr id="3" name="Szöveg helye 2">
             <a:extLst>
               <a:ext uri="{FF2B5EF4-FFF2-40B4-BE49-F238E27FC236}">
-                <a16:creationId xmlns:a16="http://schemas.microsoft.com/office/drawing/2014/main" id="{F25E112F-D29C-4DC5-8CBE-657D3CFDE649}"/>
+                <a16:creationId xmlns:a16="http://schemas.microsoft.com/office/drawing/2014/main" id="{EC33B7F2-4E85-467C-9B6E-EA2994CCC871}"/>
               </a:ext>
             </a:extLst>
           </p:cNvPr>
@@ -1126,7 +1949,7 @@
           <p:cNvPr id="4" name="Dátum helye 3">
             <a:extLst>
               <a:ext uri="{FF2B5EF4-FFF2-40B4-BE49-F238E27FC236}">
-                <a16:creationId xmlns:a16="http://schemas.microsoft.com/office/drawing/2014/main" id="{454E81DA-D51A-49DA-BCA3-3AB6FF86414D}"/>
+                <a16:creationId xmlns:a16="http://schemas.microsoft.com/office/drawing/2014/main" id="{0FC50DA1-356E-452F-BEF8-522ED577A585}"/>
               </a:ext>
             </a:extLst>
           </p:cNvPr>
@@ -1144,7 +1967,7 @@
           <a:p>
             <a:fld id="{B4742013-0DAB-4454-B6F3-6E5941F77519}" type="datetimeFigureOut">
               <a:rPr lang="en-US" smtClean="0"/>
-              <a:t>11/23/2020</a:t>
+              <a:t>11/26/2020</a:t>
             </a:fld>
             <a:endParaRPr lang="en-US"/>
           </a:p>
@@ -1155,7 +1978,7 @@
           <p:cNvPr id="5" name="Élőláb helye 4">
             <a:extLst>
               <a:ext uri="{FF2B5EF4-FFF2-40B4-BE49-F238E27FC236}">
-                <a16:creationId xmlns:a16="http://schemas.microsoft.com/office/drawing/2014/main" id="{557B9B8A-CCB5-4F4B-86E5-3F5F8945DCC5}"/>
+                <a16:creationId xmlns:a16="http://schemas.microsoft.com/office/drawing/2014/main" id="{8A1E721E-4C74-4310-8602-4A9AAA9084E4}"/>
               </a:ext>
             </a:extLst>
           </p:cNvPr>
@@ -1180,7 +2003,7 @@
           <p:cNvPr id="6" name="Dia számának helye 5">
             <a:extLst>
               <a:ext uri="{FF2B5EF4-FFF2-40B4-BE49-F238E27FC236}">
-                <a16:creationId xmlns:a16="http://schemas.microsoft.com/office/drawing/2014/main" id="{E47EEE82-CC22-45B3-A3B1-80DF2F78E3C7}"/>
+                <a16:creationId xmlns:a16="http://schemas.microsoft.com/office/drawing/2014/main" id="{37142E99-393C-4D6A-8386-77151E0F62BE}"/>
               </a:ext>
             </a:extLst>
           </p:cNvPr>
@@ -1207,7 +2030,7 @@
     </p:spTree>
     <p:extLst>
       <p:ext uri="{BB962C8B-B14F-4D97-AF65-F5344CB8AC3E}">
-        <p14:creationId xmlns:p14="http://schemas.microsoft.com/office/powerpoint/2010/main" val="1229500505"/>
+        <p14:creationId xmlns:p14="http://schemas.microsoft.com/office/powerpoint/2010/main" val="770283063"/>
       </p:ext>
     </p:extLst>
   </p:cSld>
@@ -1239,7 +2062,7 @@
           <p:cNvPr id="2" name="Cím 1">
             <a:extLst>
               <a:ext uri="{FF2B5EF4-FFF2-40B4-BE49-F238E27FC236}">
-                <a16:creationId xmlns:a16="http://schemas.microsoft.com/office/drawing/2014/main" id="{10951CEE-B407-44DD-9DDD-4BCE393C984F}"/>
+                <a16:creationId xmlns:a16="http://schemas.microsoft.com/office/drawing/2014/main" id="{D33A8698-572C-403C-A6F4-9EEDFB61684F}"/>
               </a:ext>
             </a:extLst>
           </p:cNvPr>
@@ -1268,7 +2091,7 @@
           <p:cNvPr id="3" name="Tartalom helye 2">
             <a:extLst>
               <a:ext uri="{FF2B5EF4-FFF2-40B4-BE49-F238E27FC236}">
-                <a16:creationId xmlns:a16="http://schemas.microsoft.com/office/drawing/2014/main" id="{F1653D16-EB28-4859-A4D5-D356676A3DAC}"/>
+                <a16:creationId xmlns:a16="http://schemas.microsoft.com/office/drawing/2014/main" id="{FB9152FA-D82C-4D91-90B8-8BEB4812FDD1}"/>
               </a:ext>
             </a:extLst>
           </p:cNvPr>
@@ -1331,7 +2154,7 @@
           <p:cNvPr id="4" name="Tartalom helye 3">
             <a:extLst>
               <a:ext uri="{FF2B5EF4-FFF2-40B4-BE49-F238E27FC236}">
-                <a16:creationId xmlns:a16="http://schemas.microsoft.com/office/drawing/2014/main" id="{9EA0AB38-87D8-4FDB-B015-23F4F345ECA0}"/>
+                <a16:creationId xmlns:a16="http://schemas.microsoft.com/office/drawing/2014/main" id="{F9E11989-8FA9-47C9-A978-D87C74CDA821}"/>
               </a:ext>
             </a:extLst>
           </p:cNvPr>
@@ -1394,7 +2217,7 @@
           <p:cNvPr id="5" name="Dátum helye 4">
             <a:extLst>
               <a:ext uri="{FF2B5EF4-FFF2-40B4-BE49-F238E27FC236}">
-                <a16:creationId xmlns:a16="http://schemas.microsoft.com/office/drawing/2014/main" id="{262FA0FA-2F66-4B95-92DB-22BD23CAF56E}"/>
+                <a16:creationId xmlns:a16="http://schemas.microsoft.com/office/drawing/2014/main" id="{0B55C1D3-3357-45FB-A08E-1157F4407542}"/>
               </a:ext>
             </a:extLst>
           </p:cNvPr>
@@ -1412,7 +2235,7 @@
           <a:p>
             <a:fld id="{B4742013-0DAB-4454-B6F3-6E5941F77519}" type="datetimeFigureOut">
               <a:rPr lang="en-US" smtClean="0"/>
-              <a:t>11/23/2020</a:t>
+              <a:t>11/26/2020</a:t>
             </a:fld>
             <a:endParaRPr lang="en-US"/>
           </a:p>
@@ -1423,7 +2246,7 @@
           <p:cNvPr id="6" name="Élőláb helye 5">
             <a:extLst>
               <a:ext uri="{FF2B5EF4-FFF2-40B4-BE49-F238E27FC236}">
-                <a16:creationId xmlns:a16="http://schemas.microsoft.com/office/drawing/2014/main" id="{D4DF0F91-85DD-4120-ADA7-E93957E3204B}"/>
+                <a16:creationId xmlns:a16="http://schemas.microsoft.com/office/drawing/2014/main" id="{58C0A66A-4EC7-4651-A362-ED3A49B64844}"/>
               </a:ext>
             </a:extLst>
           </p:cNvPr>
@@ -1448,7 +2271,7 @@
           <p:cNvPr id="7" name="Dia számának helye 6">
             <a:extLst>
               <a:ext uri="{FF2B5EF4-FFF2-40B4-BE49-F238E27FC236}">
-                <a16:creationId xmlns:a16="http://schemas.microsoft.com/office/drawing/2014/main" id="{35A5EF73-A974-47F5-94F8-23A9DB804D71}"/>
+                <a16:creationId xmlns:a16="http://schemas.microsoft.com/office/drawing/2014/main" id="{10B2F988-A4BC-4F76-A878-1B0C57D77568}"/>
               </a:ext>
             </a:extLst>
           </p:cNvPr>
@@ -1475,7 +2298,7 @@
     </p:spTree>
     <p:extLst>
       <p:ext uri="{BB962C8B-B14F-4D97-AF65-F5344CB8AC3E}">
-        <p14:creationId xmlns:p14="http://schemas.microsoft.com/office/powerpoint/2010/main" val="1398848945"/>
+        <p14:creationId xmlns:p14="http://schemas.microsoft.com/office/powerpoint/2010/main" val="2006880345"/>
       </p:ext>
     </p:extLst>
   </p:cSld>
@@ -1507,7 +2330,7 @@
           <p:cNvPr id="2" name="Cím 1">
             <a:extLst>
               <a:ext uri="{FF2B5EF4-FFF2-40B4-BE49-F238E27FC236}">
-                <a16:creationId xmlns:a16="http://schemas.microsoft.com/office/drawing/2014/main" id="{171FD661-CC1F-40A2-BA11-20F842FA2CA0}"/>
+                <a16:creationId xmlns:a16="http://schemas.microsoft.com/office/drawing/2014/main" id="{E24910F7-6A9A-46B0-AC98-C0939C9324B2}"/>
               </a:ext>
             </a:extLst>
           </p:cNvPr>
@@ -1541,7 +2364,7 @@
           <p:cNvPr id="3" name="Szöveg helye 2">
             <a:extLst>
               <a:ext uri="{FF2B5EF4-FFF2-40B4-BE49-F238E27FC236}">
-                <a16:creationId xmlns:a16="http://schemas.microsoft.com/office/drawing/2014/main" id="{B9241B05-1E52-48B0-AE4F-E03C7C8A166B}"/>
+                <a16:creationId xmlns:a16="http://schemas.microsoft.com/office/drawing/2014/main" id="{8E47182F-C7F5-482C-8C12-AF85EE9790BC}"/>
               </a:ext>
             </a:extLst>
           </p:cNvPr>
@@ -1612,7 +2435,7 @@
           <p:cNvPr id="4" name="Tartalom helye 3">
             <a:extLst>
               <a:ext uri="{FF2B5EF4-FFF2-40B4-BE49-F238E27FC236}">
-                <a16:creationId xmlns:a16="http://schemas.microsoft.com/office/drawing/2014/main" id="{A013AC6B-664F-42DC-ABBC-FE68AED57A33}"/>
+                <a16:creationId xmlns:a16="http://schemas.microsoft.com/office/drawing/2014/main" id="{7780727F-7A05-4AF3-8402-FA6305AF9511}"/>
               </a:ext>
             </a:extLst>
           </p:cNvPr>
@@ -1675,7 +2498,7 @@
           <p:cNvPr id="5" name="Szöveg helye 4">
             <a:extLst>
               <a:ext uri="{FF2B5EF4-FFF2-40B4-BE49-F238E27FC236}">
-                <a16:creationId xmlns:a16="http://schemas.microsoft.com/office/drawing/2014/main" id="{127CFCE8-C125-4BB2-892A-B0F84A785150}"/>
+                <a16:creationId xmlns:a16="http://schemas.microsoft.com/office/drawing/2014/main" id="{12409554-3F5F-4035-8DBB-993DCAFC1A0A}"/>
               </a:ext>
             </a:extLst>
           </p:cNvPr>
@@ -1746,7 +2569,7 @@
           <p:cNvPr id="6" name="Tartalom helye 5">
             <a:extLst>
               <a:ext uri="{FF2B5EF4-FFF2-40B4-BE49-F238E27FC236}">
-                <a16:creationId xmlns:a16="http://schemas.microsoft.com/office/drawing/2014/main" id="{8929C854-3556-40D5-8A6E-10D61DC89F36}"/>
+                <a16:creationId xmlns:a16="http://schemas.microsoft.com/office/drawing/2014/main" id="{EACFCF76-A2B0-47C8-8B06-BF086545C395}"/>
               </a:ext>
             </a:extLst>
           </p:cNvPr>
@@ -1809,7 +2632,7 @@
           <p:cNvPr id="7" name="Dátum helye 6">
             <a:extLst>
               <a:ext uri="{FF2B5EF4-FFF2-40B4-BE49-F238E27FC236}">
-                <a16:creationId xmlns:a16="http://schemas.microsoft.com/office/drawing/2014/main" id="{1291925B-2807-4F38-98F9-15235F73EF0D}"/>
+                <a16:creationId xmlns:a16="http://schemas.microsoft.com/office/drawing/2014/main" id="{C88B1FA0-9E67-4AD6-B444-9B099F7248FE}"/>
               </a:ext>
             </a:extLst>
           </p:cNvPr>
@@ -1827,7 +2650,7 @@
           <a:p>
             <a:fld id="{B4742013-0DAB-4454-B6F3-6E5941F77519}" type="datetimeFigureOut">
               <a:rPr lang="en-US" smtClean="0"/>
-              <a:t>11/23/2020</a:t>
+              <a:t>11/26/2020</a:t>
             </a:fld>
             <a:endParaRPr lang="en-US"/>
           </a:p>
@@ -1838,7 +2661,7 @@
           <p:cNvPr id="8" name="Élőláb helye 7">
             <a:extLst>
               <a:ext uri="{FF2B5EF4-FFF2-40B4-BE49-F238E27FC236}">
-                <a16:creationId xmlns:a16="http://schemas.microsoft.com/office/drawing/2014/main" id="{BE7C72C3-481C-474E-B5AB-077FDAF709A7}"/>
+                <a16:creationId xmlns:a16="http://schemas.microsoft.com/office/drawing/2014/main" id="{EACF1850-BEF4-4CE3-9797-24A61B0F5554}"/>
               </a:ext>
             </a:extLst>
           </p:cNvPr>
@@ -1863,7 +2686,7 @@
           <p:cNvPr id="9" name="Dia számának helye 8">
             <a:extLst>
               <a:ext uri="{FF2B5EF4-FFF2-40B4-BE49-F238E27FC236}">
-                <a16:creationId xmlns:a16="http://schemas.microsoft.com/office/drawing/2014/main" id="{A36FCFCB-5A8A-44C0-88BD-0C77131FC492}"/>
+                <a16:creationId xmlns:a16="http://schemas.microsoft.com/office/drawing/2014/main" id="{F04E699F-9A71-401B-BEBD-616F84E6A6DD}"/>
               </a:ext>
             </a:extLst>
           </p:cNvPr>
@@ -1890,7 +2713,7 @@
     </p:spTree>
     <p:extLst>
       <p:ext uri="{BB962C8B-B14F-4D97-AF65-F5344CB8AC3E}">
-        <p14:creationId xmlns:p14="http://schemas.microsoft.com/office/powerpoint/2010/main" val="2076669507"/>
+        <p14:creationId xmlns:p14="http://schemas.microsoft.com/office/powerpoint/2010/main" val="1355393535"/>
       </p:ext>
     </p:extLst>
   </p:cSld>
@@ -1922,7 +2745,7 @@
           <p:cNvPr id="2" name="Cím 1">
             <a:extLst>
               <a:ext uri="{FF2B5EF4-FFF2-40B4-BE49-F238E27FC236}">
-                <a16:creationId xmlns:a16="http://schemas.microsoft.com/office/drawing/2014/main" id="{C4150F4F-B812-4012-A6C7-8BEE8C3F3D35}"/>
+                <a16:creationId xmlns:a16="http://schemas.microsoft.com/office/drawing/2014/main" id="{5D519E29-DCA9-4570-AFB5-29EAFC8A5F85}"/>
               </a:ext>
             </a:extLst>
           </p:cNvPr>
@@ -1951,7 +2774,7 @@
           <p:cNvPr id="3" name="Dátum helye 2">
             <a:extLst>
               <a:ext uri="{FF2B5EF4-FFF2-40B4-BE49-F238E27FC236}">
-                <a16:creationId xmlns:a16="http://schemas.microsoft.com/office/drawing/2014/main" id="{53B45E4C-3918-4E4E-BA21-C572E5FFF55F}"/>
+                <a16:creationId xmlns:a16="http://schemas.microsoft.com/office/drawing/2014/main" id="{A0547862-0D61-43EC-8FC8-31ACD845F678}"/>
               </a:ext>
             </a:extLst>
           </p:cNvPr>
@@ -1969,7 +2792,7 @@
           <a:p>
             <a:fld id="{B4742013-0DAB-4454-B6F3-6E5941F77519}" type="datetimeFigureOut">
               <a:rPr lang="en-US" smtClean="0"/>
-              <a:t>11/23/2020</a:t>
+              <a:t>11/26/2020</a:t>
             </a:fld>
             <a:endParaRPr lang="en-US"/>
           </a:p>
@@ -1980,7 +2803,7 @@
           <p:cNvPr id="4" name="Élőláb helye 3">
             <a:extLst>
               <a:ext uri="{FF2B5EF4-FFF2-40B4-BE49-F238E27FC236}">
-                <a16:creationId xmlns:a16="http://schemas.microsoft.com/office/drawing/2014/main" id="{1DFC91C9-B87B-48F2-B79E-0B504E30DAB1}"/>
+                <a16:creationId xmlns:a16="http://schemas.microsoft.com/office/drawing/2014/main" id="{A716BF68-25B7-40A8-95A9-7C9A166CB3D5}"/>
               </a:ext>
             </a:extLst>
           </p:cNvPr>
@@ -2005,7 +2828,7 @@
           <p:cNvPr id="5" name="Dia számának helye 4">
             <a:extLst>
               <a:ext uri="{FF2B5EF4-FFF2-40B4-BE49-F238E27FC236}">
-                <a16:creationId xmlns:a16="http://schemas.microsoft.com/office/drawing/2014/main" id="{35F7DD2E-2419-441D-822B-904858C86F3A}"/>
+                <a16:creationId xmlns:a16="http://schemas.microsoft.com/office/drawing/2014/main" id="{22955472-97A7-4B02-B9FF-D8EFF7280996}"/>
               </a:ext>
             </a:extLst>
           </p:cNvPr>
@@ -2032,7 +2855,7 @@
     </p:spTree>
     <p:extLst>
       <p:ext uri="{BB962C8B-B14F-4D97-AF65-F5344CB8AC3E}">
-        <p14:creationId xmlns:p14="http://schemas.microsoft.com/office/powerpoint/2010/main" val="2869731842"/>
+        <p14:creationId xmlns:p14="http://schemas.microsoft.com/office/powerpoint/2010/main" val="3280847280"/>
       </p:ext>
     </p:extLst>
   </p:cSld>
@@ -2064,7 +2887,7 @@
           <p:cNvPr id="2" name="Dátum helye 1">
             <a:extLst>
               <a:ext uri="{FF2B5EF4-FFF2-40B4-BE49-F238E27FC236}">
-                <a16:creationId xmlns:a16="http://schemas.microsoft.com/office/drawing/2014/main" id="{F61C034E-C8F5-48A6-931B-2BD9C71B1352}"/>
+                <a16:creationId xmlns:a16="http://schemas.microsoft.com/office/drawing/2014/main" id="{AA3C9B00-9E7E-41CC-996B-CABD9561232E}"/>
               </a:ext>
             </a:extLst>
           </p:cNvPr>
@@ -2082,7 +2905,7 @@
           <a:p>
             <a:fld id="{B4742013-0DAB-4454-B6F3-6E5941F77519}" type="datetimeFigureOut">
               <a:rPr lang="en-US" smtClean="0"/>
-              <a:t>11/23/2020</a:t>
+              <a:t>11/26/2020</a:t>
             </a:fld>
             <a:endParaRPr lang="en-US"/>
           </a:p>
@@ -2093,7 +2916,7 @@
           <p:cNvPr id="3" name="Élőláb helye 2">
             <a:extLst>
               <a:ext uri="{FF2B5EF4-FFF2-40B4-BE49-F238E27FC236}">
-                <a16:creationId xmlns:a16="http://schemas.microsoft.com/office/drawing/2014/main" id="{2D3FB3C0-A80E-4F91-A3C5-74492B1651F0}"/>
+                <a16:creationId xmlns:a16="http://schemas.microsoft.com/office/drawing/2014/main" id="{8756F288-241B-4900-80E8-53D6A6F8E7D8}"/>
               </a:ext>
             </a:extLst>
           </p:cNvPr>
@@ -2118,7 +2941,7 @@
           <p:cNvPr id="4" name="Dia számának helye 3">
             <a:extLst>
               <a:ext uri="{FF2B5EF4-FFF2-40B4-BE49-F238E27FC236}">
-                <a16:creationId xmlns:a16="http://schemas.microsoft.com/office/drawing/2014/main" id="{297D6C06-A744-49A5-AB4C-7F5AACAF3C1A}"/>
+                <a16:creationId xmlns:a16="http://schemas.microsoft.com/office/drawing/2014/main" id="{27B798C4-1DFC-4F44-B899-58D740439668}"/>
               </a:ext>
             </a:extLst>
           </p:cNvPr>
@@ -2145,7 +2968,7 @@
     </p:spTree>
     <p:extLst>
       <p:ext uri="{BB962C8B-B14F-4D97-AF65-F5344CB8AC3E}">
-        <p14:creationId xmlns:p14="http://schemas.microsoft.com/office/powerpoint/2010/main" val="3832316916"/>
+        <p14:creationId xmlns:p14="http://schemas.microsoft.com/office/powerpoint/2010/main" val="4184516490"/>
       </p:ext>
     </p:extLst>
   </p:cSld>
@@ -2177,7 +3000,7 @@
           <p:cNvPr id="2" name="Cím 1">
             <a:extLst>
               <a:ext uri="{FF2B5EF4-FFF2-40B4-BE49-F238E27FC236}">
-                <a16:creationId xmlns:a16="http://schemas.microsoft.com/office/drawing/2014/main" id="{834A1E1E-7350-456D-8E04-5FC5BC2A142F}"/>
+                <a16:creationId xmlns:a16="http://schemas.microsoft.com/office/drawing/2014/main" id="{DCFB0EFC-C460-49CD-884D-BF42322F84DC}"/>
               </a:ext>
             </a:extLst>
           </p:cNvPr>
@@ -2215,7 +3038,7 @@
           <p:cNvPr id="3" name="Tartalom helye 2">
             <a:extLst>
               <a:ext uri="{FF2B5EF4-FFF2-40B4-BE49-F238E27FC236}">
-                <a16:creationId xmlns:a16="http://schemas.microsoft.com/office/drawing/2014/main" id="{3BE908ED-1CCA-41C3-9F08-6F42E665D2DA}"/>
+                <a16:creationId xmlns:a16="http://schemas.microsoft.com/office/drawing/2014/main" id="{1E4BAEDC-D260-4A3B-AED5-C6018252AD25}"/>
               </a:ext>
             </a:extLst>
           </p:cNvPr>
@@ -2306,7 +3129,7 @@
           <p:cNvPr id="4" name="Szöveg helye 3">
             <a:extLst>
               <a:ext uri="{FF2B5EF4-FFF2-40B4-BE49-F238E27FC236}">
-                <a16:creationId xmlns:a16="http://schemas.microsoft.com/office/drawing/2014/main" id="{06DBB2F8-0739-4AFF-BDE2-C6D5449D2FEF}"/>
+                <a16:creationId xmlns:a16="http://schemas.microsoft.com/office/drawing/2014/main" id="{FFA772AC-948E-4408-AAD9-AF6790455971}"/>
               </a:ext>
             </a:extLst>
           </p:cNvPr>
@@ -2377,7 +3200,7 @@
           <p:cNvPr id="5" name="Dátum helye 4">
             <a:extLst>
               <a:ext uri="{FF2B5EF4-FFF2-40B4-BE49-F238E27FC236}">
-                <a16:creationId xmlns:a16="http://schemas.microsoft.com/office/drawing/2014/main" id="{A0544DAB-AFE1-4E6D-97DA-767D0283B4F2}"/>
+                <a16:creationId xmlns:a16="http://schemas.microsoft.com/office/drawing/2014/main" id="{0FFC212D-D371-4CD7-B19B-5FF859C0DF78}"/>
               </a:ext>
             </a:extLst>
           </p:cNvPr>
@@ -2395,7 +3218,7 @@
           <a:p>
             <a:fld id="{B4742013-0DAB-4454-B6F3-6E5941F77519}" type="datetimeFigureOut">
               <a:rPr lang="en-US" smtClean="0"/>
-              <a:t>11/23/2020</a:t>
+              <a:t>11/26/2020</a:t>
             </a:fld>
             <a:endParaRPr lang="en-US"/>
           </a:p>
@@ -2406,7 +3229,7 @@
           <p:cNvPr id="6" name="Élőláb helye 5">
             <a:extLst>
               <a:ext uri="{FF2B5EF4-FFF2-40B4-BE49-F238E27FC236}">
-                <a16:creationId xmlns:a16="http://schemas.microsoft.com/office/drawing/2014/main" id="{3BA6A357-249D-45FB-8B7F-D4168A849378}"/>
+                <a16:creationId xmlns:a16="http://schemas.microsoft.com/office/drawing/2014/main" id="{04E07689-86ED-44F2-A621-AE7F618F1185}"/>
               </a:ext>
             </a:extLst>
           </p:cNvPr>
@@ -2431,7 +3254,7 @@
           <p:cNvPr id="7" name="Dia számának helye 6">
             <a:extLst>
               <a:ext uri="{FF2B5EF4-FFF2-40B4-BE49-F238E27FC236}">
-                <a16:creationId xmlns:a16="http://schemas.microsoft.com/office/drawing/2014/main" id="{50DACAB3-0DD0-424A-ACC3-8B97730A29C9}"/>
+                <a16:creationId xmlns:a16="http://schemas.microsoft.com/office/drawing/2014/main" id="{46F479DC-FB9A-47CE-9192-5DFB75506B4F}"/>
               </a:ext>
             </a:extLst>
           </p:cNvPr>
@@ -2458,7 +3281,7 @@
     </p:spTree>
     <p:extLst>
       <p:ext uri="{BB962C8B-B14F-4D97-AF65-F5344CB8AC3E}">
-        <p14:creationId xmlns:p14="http://schemas.microsoft.com/office/powerpoint/2010/main" val="3943979406"/>
+        <p14:creationId xmlns:p14="http://schemas.microsoft.com/office/powerpoint/2010/main" val="885986675"/>
       </p:ext>
     </p:extLst>
   </p:cSld>
@@ -2490,7 +3313,7 @@
           <p:cNvPr id="2" name="Cím 1">
             <a:extLst>
               <a:ext uri="{FF2B5EF4-FFF2-40B4-BE49-F238E27FC236}">
-                <a16:creationId xmlns:a16="http://schemas.microsoft.com/office/drawing/2014/main" id="{CAA7694A-647A-4611-B617-7A8228C8A7C3}"/>
+                <a16:creationId xmlns:a16="http://schemas.microsoft.com/office/drawing/2014/main" id="{D03FC6D7-3B50-4AA7-B107-E08EFAF60848}"/>
               </a:ext>
             </a:extLst>
           </p:cNvPr>
@@ -2528,7 +3351,7 @@
           <p:cNvPr id="3" name="Kép helye 2">
             <a:extLst>
               <a:ext uri="{FF2B5EF4-FFF2-40B4-BE49-F238E27FC236}">
-                <a16:creationId xmlns:a16="http://schemas.microsoft.com/office/drawing/2014/main" id="{0124F592-0726-495A-ACB6-6BDA938EB063}"/>
+                <a16:creationId xmlns:a16="http://schemas.microsoft.com/office/drawing/2014/main" id="{21138AB5-1D00-4AF5-BE2D-F273C5E258FD}"/>
               </a:ext>
             </a:extLst>
           </p:cNvPr>
@@ -2595,7 +3418,7 @@
           <p:cNvPr id="4" name="Szöveg helye 3">
             <a:extLst>
               <a:ext uri="{FF2B5EF4-FFF2-40B4-BE49-F238E27FC236}">
-                <a16:creationId xmlns:a16="http://schemas.microsoft.com/office/drawing/2014/main" id="{032540CC-A25D-4FAC-9549-9A5C276CA775}"/>
+                <a16:creationId xmlns:a16="http://schemas.microsoft.com/office/drawing/2014/main" id="{8B436158-0968-4FE2-8409-92FDB2CF0146}"/>
               </a:ext>
             </a:extLst>
           </p:cNvPr>
@@ -2666,7 +3489,7 @@
           <p:cNvPr id="5" name="Dátum helye 4">
             <a:extLst>
               <a:ext uri="{FF2B5EF4-FFF2-40B4-BE49-F238E27FC236}">
-                <a16:creationId xmlns:a16="http://schemas.microsoft.com/office/drawing/2014/main" id="{E014250F-1FD0-4BD5-959B-D203DB162410}"/>
+                <a16:creationId xmlns:a16="http://schemas.microsoft.com/office/drawing/2014/main" id="{300DE852-293F-4105-A56E-EC126812F5BC}"/>
               </a:ext>
             </a:extLst>
           </p:cNvPr>
@@ -2684,7 +3507,7 @@
           <a:p>
             <a:fld id="{B4742013-0DAB-4454-B6F3-6E5941F77519}" type="datetimeFigureOut">
               <a:rPr lang="en-US" smtClean="0"/>
-              <a:t>11/23/2020</a:t>
+              <a:t>11/26/2020</a:t>
             </a:fld>
             <a:endParaRPr lang="en-US"/>
           </a:p>
@@ -2695,7 +3518,7 @@
           <p:cNvPr id="6" name="Élőláb helye 5">
             <a:extLst>
               <a:ext uri="{FF2B5EF4-FFF2-40B4-BE49-F238E27FC236}">
-                <a16:creationId xmlns:a16="http://schemas.microsoft.com/office/drawing/2014/main" id="{69358BB1-C3AE-4CAF-98FB-D2C0A396F869}"/>
+                <a16:creationId xmlns:a16="http://schemas.microsoft.com/office/drawing/2014/main" id="{002F4CA9-8D3C-4416-B4C1-9A22451EF9CF}"/>
               </a:ext>
             </a:extLst>
           </p:cNvPr>
@@ -2720,7 +3543,7 @@
           <p:cNvPr id="7" name="Dia számának helye 6">
             <a:extLst>
               <a:ext uri="{FF2B5EF4-FFF2-40B4-BE49-F238E27FC236}">
-                <a16:creationId xmlns:a16="http://schemas.microsoft.com/office/drawing/2014/main" id="{E779A598-38F7-4A58-91A4-7AF611601F36}"/>
+                <a16:creationId xmlns:a16="http://schemas.microsoft.com/office/drawing/2014/main" id="{E75D98F0-7001-4EBF-9A88-313BE3D16703}"/>
               </a:ext>
             </a:extLst>
           </p:cNvPr>
@@ -2747,7 +3570,7 @@
     </p:spTree>
     <p:extLst>
       <p:ext uri="{BB962C8B-B14F-4D97-AF65-F5344CB8AC3E}">
-        <p14:creationId xmlns:p14="http://schemas.microsoft.com/office/powerpoint/2010/main" val="4102729198"/>
+        <p14:creationId xmlns:p14="http://schemas.microsoft.com/office/powerpoint/2010/main" val="3276294281"/>
       </p:ext>
     </p:extLst>
   </p:cSld>
@@ -2784,7 +3607,7 @@
           <p:cNvPr id="2" name="Cím helye 1">
             <a:extLst>
               <a:ext uri="{FF2B5EF4-FFF2-40B4-BE49-F238E27FC236}">
-                <a16:creationId xmlns:a16="http://schemas.microsoft.com/office/drawing/2014/main" id="{80BDF605-2658-4905-804A-7DF621E3E17D}"/>
+                <a16:creationId xmlns:a16="http://schemas.microsoft.com/office/drawing/2014/main" id="{8600F6CF-526A-4456-9568-E90A5D813B85}"/>
               </a:ext>
             </a:extLst>
           </p:cNvPr>
@@ -2823,7 +3646,7 @@
           <p:cNvPr id="3" name="Szöveg helye 2">
             <a:extLst>
               <a:ext uri="{FF2B5EF4-FFF2-40B4-BE49-F238E27FC236}">
-                <a16:creationId xmlns:a16="http://schemas.microsoft.com/office/drawing/2014/main" id="{0EE097B5-5AE1-402A-A323-8F958C27093D}"/>
+                <a16:creationId xmlns:a16="http://schemas.microsoft.com/office/drawing/2014/main" id="{FF7D64FD-8A9F-4BA9-B157-C4D3CD7C03D7}"/>
               </a:ext>
             </a:extLst>
           </p:cNvPr>
@@ -2891,7 +3714,7 @@
           <p:cNvPr id="4" name="Dátum helye 3">
             <a:extLst>
               <a:ext uri="{FF2B5EF4-FFF2-40B4-BE49-F238E27FC236}">
-                <a16:creationId xmlns:a16="http://schemas.microsoft.com/office/drawing/2014/main" id="{F2F267CA-B37E-418C-AE7C-8BB7532BCD25}"/>
+                <a16:creationId xmlns:a16="http://schemas.microsoft.com/office/drawing/2014/main" id="{5A0B6864-B642-447C-BB10-15F87036D094}"/>
               </a:ext>
             </a:extLst>
           </p:cNvPr>
@@ -2927,7 +3750,7 @@
           <a:p>
             <a:fld id="{B4742013-0DAB-4454-B6F3-6E5941F77519}" type="datetimeFigureOut">
               <a:rPr lang="en-US" smtClean="0"/>
-              <a:t>11/23/2020</a:t>
+              <a:t>11/26/2020</a:t>
             </a:fld>
             <a:endParaRPr lang="en-US"/>
           </a:p>
@@ -2938,7 +3761,7 @@
           <p:cNvPr id="5" name="Élőláb helye 4">
             <a:extLst>
               <a:ext uri="{FF2B5EF4-FFF2-40B4-BE49-F238E27FC236}">
-                <a16:creationId xmlns:a16="http://schemas.microsoft.com/office/drawing/2014/main" id="{4C2B1AB5-B117-4E7E-B3BE-591C2EA00611}"/>
+                <a16:creationId xmlns:a16="http://schemas.microsoft.com/office/drawing/2014/main" id="{6C93B0A4-E722-4711-A1D5-30446ED55A07}"/>
               </a:ext>
             </a:extLst>
           </p:cNvPr>
@@ -2981,7 +3804,7 @@
           <p:cNvPr id="6" name="Dia számának helye 5">
             <a:extLst>
               <a:ext uri="{FF2B5EF4-FFF2-40B4-BE49-F238E27FC236}">
-                <a16:creationId xmlns:a16="http://schemas.microsoft.com/office/drawing/2014/main" id="{6D08C6C6-924F-48BF-A25D-EF168E2DA7D9}"/>
+                <a16:creationId xmlns:a16="http://schemas.microsoft.com/office/drawing/2014/main" id="{5D9F444E-0028-40AF-A236-057AECD7BAED}"/>
               </a:ext>
             </a:extLst>
           </p:cNvPr>
@@ -3026,23 +3849,23 @@
     </p:spTree>
     <p:extLst>
       <p:ext uri="{BB962C8B-B14F-4D97-AF65-F5344CB8AC3E}">
-        <p14:creationId xmlns:p14="http://schemas.microsoft.com/office/powerpoint/2010/main" val="3416411698"/>
+        <p14:creationId xmlns:p14="http://schemas.microsoft.com/office/powerpoint/2010/main" val="730255367"/>
       </p:ext>
     </p:extLst>
   </p:cSld>
   <p:clrMap bg1="lt1" tx1="dk1" bg2="lt2" tx2="dk2" accent1="accent1" accent2="accent2" accent3="accent3" accent4="accent4" accent5="accent5" accent6="accent6" hlink="hlink" folHlink="folHlink"/>
   <p:sldLayoutIdLst>
-    <p:sldLayoutId id="2147483649" r:id="rId1"/>
-    <p:sldLayoutId id="2147483650" r:id="rId2"/>
-    <p:sldLayoutId id="2147483651" r:id="rId3"/>
-    <p:sldLayoutId id="2147483652" r:id="rId4"/>
-    <p:sldLayoutId id="2147483653" r:id="rId5"/>
-    <p:sldLayoutId id="2147483654" r:id="rId6"/>
-    <p:sldLayoutId id="2147483655" r:id="rId7"/>
-    <p:sldLayoutId id="2147483656" r:id="rId8"/>
-    <p:sldLayoutId id="2147483657" r:id="rId9"/>
-    <p:sldLayoutId id="2147483658" r:id="rId10"/>
-    <p:sldLayoutId id="2147483659" r:id="rId11"/>
+    <p:sldLayoutId id="2147483661" r:id="rId1"/>
+    <p:sldLayoutId id="2147483662" r:id="rId2"/>
+    <p:sldLayoutId id="2147483663" r:id="rId3"/>
+    <p:sldLayoutId id="2147483664" r:id="rId4"/>
+    <p:sldLayoutId id="2147483665" r:id="rId5"/>
+    <p:sldLayoutId id="2147483666" r:id="rId6"/>
+    <p:sldLayoutId id="2147483667" r:id="rId7"/>
+    <p:sldLayoutId id="2147483668" r:id="rId8"/>
+    <p:sldLayoutId id="2147483669" r:id="rId9"/>
+    <p:sldLayoutId id="2147483670" r:id="rId10"/>
+    <p:sldLayoutId id="2147483671" r:id="rId11"/>
   </p:sldLayoutIdLst>
   <p:txStyles>
     <p:titleStyle>
@@ -3346,43 +4169,10 @@
       </p:grpSpPr>
       <p:sp>
         <p:nvSpPr>
-          <p:cNvPr id="2" name="Cím 1">
-            <a:extLst>
-              <a:ext uri="{FF2B5EF4-FFF2-40B4-BE49-F238E27FC236}">
-                <a16:creationId xmlns:a16="http://schemas.microsoft.com/office/drawing/2014/main" id="{3C05F290-5406-4269-86E8-2ADDA82118BA}"/>
-              </a:ext>
-            </a:extLst>
-          </p:cNvPr>
-          <p:cNvSpPr>
-            <a:spLocks noGrp="1"/>
-          </p:cNvSpPr>
-          <p:nvPr>
-            <p:ph type="title"/>
-          </p:nvPr>
-        </p:nvSpPr>
-        <p:spPr/>
-        <p:txBody>
-          <a:bodyPr/>
-          <a:lstStyle/>
-          <a:p>
-            <a:r>
-              <a:rPr lang="hu-HU" dirty="0"/>
-              <a:t>Main </a:t>
-            </a:r>
-            <a:r>
-              <a:rPr lang="hu-HU" dirty="0" err="1"/>
-              <a:t>nezet</a:t>
-            </a:r>
-            <a:endParaRPr lang="en-US" dirty="0"/>
-          </a:p>
-        </p:txBody>
-      </p:sp>
-      <p:sp>
-        <p:nvSpPr>
-          <p:cNvPr id="4" name="Téglalap 3">
-            <a:extLst>
-              <a:ext uri="{FF2B5EF4-FFF2-40B4-BE49-F238E27FC236}">
-                <a16:creationId xmlns:a16="http://schemas.microsoft.com/office/drawing/2014/main" id="{3EE99E1A-DC53-4D0E-A65B-098959359736}"/>
+          <p:cNvPr id="4" name="Téglalap: lekerekített 3">
+            <a:extLst>
+              <a:ext uri="{FF2B5EF4-FFF2-40B4-BE49-F238E27FC236}">
+                <a16:creationId xmlns:a16="http://schemas.microsoft.com/office/drawing/2014/main" id="{71D0025A-2AC6-43E9-9913-9A0B753B5670}"/>
               </a:ext>
             </a:extLst>
           </p:cNvPr>
@@ -3391,10 +4181,10 @@
         </p:nvSpPr>
         <p:spPr>
           <a:xfrm>
-            <a:off x="1865376" y="1539970"/>
-            <a:ext cx="3474720" cy="4867783"/>
+            <a:off x="2916936" y="3529584"/>
+            <a:ext cx="969264" cy="1426464"/>
           </a:xfrm>
-          <a:prstGeom prst="rect">
+          <a:prstGeom prst="roundRect">
             <a:avLst/>
           </a:prstGeom>
         </p:spPr>
@@ -3419,16 +4209,20 @@
           <a:lstStyle/>
           <a:p>
             <a:pPr algn="ctr"/>
-            <a:endParaRPr lang="en-US"/>
-          </a:p>
-        </p:txBody>
-      </p:sp>
-      <p:sp>
-        <p:nvSpPr>
-          <p:cNvPr id="5" name="Téglalap 4">
-            <a:extLst>
-              <a:ext uri="{FF2B5EF4-FFF2-40B4-BE49-F238E27FC236}">
-                <a16:creationId xmlns:a16="http://schemas.microsoft.com/office/drawing/2014/main" id="{8C51F31F-BE7A-4208-BFB9-CD7B28B8D0CC}"/>
+            <a:r>
+              <a:rPr lang="hu-HU" dirty="0"/>
+              <a:t>Main</a:t>
+            </a:r>
+            <a:endParaRPr lang="en-US" dirty="0"/>
+          </a:p>
+        </p:txBody>
+      </p:sp>
+      <p:sp>
+        <p:nvSpPr>
+          <p:cNvPr id="9" name="Téglalap: lekerekített 8">
+            <a:extLst>
+              <a:ext uri="{FF2B5EF4-FFF2-40B4-BE49-F238E27FC236}">
+                <a16:creationId xmlns:a16="http://schemas.microsoft.com/office/drawing/2014/main" id="{7424A7B0-A581-48D8-AFCD-EEB3C4EE20E1}"/>
               </a:ext>
             </a:extLst>
           </p:cNvPr>
@@ -3437,64 +4231,10 @@
         </p:nvSpPr>
         <p:spPr>
           <a:xfrm>
-            <a:off x="1865376" y="1539970"/>
-            <a:ext cx="3474720" cy="914400"/>
+            <a:off x="4834128" y="3529584"/>
+            <a:ext cx="969264" cy="1426464"/>
           </a:xfrm>
-          <a:prstGeom prst="rect">
-            <a:avLst/>
-          </a:prstGeom>
-        </p:spPr>
-        <p:style>
-          <a:lnRef idx="2">
-            <a:schemeClr val="dk1">
-              <a:shade val="50000"/>
-            </a:schemeClr>
-          </a:lnRef>
-          <a:fillRef idx="1">
-            <a:schemeClr val="dk1"/>
-          </a:fillRef>
-          <a:effectRef idx="0">
-            <a:schemeClr val="dk1"/>
-          </a:effectRef>
-          <a:fontRef idx="minor">
-            <a:schemeClr val="lt1"/>
-          </a:fontRef>
-        </p:style>
-        <p:txBody>
-          <a:bodyPr rtlCol="0" anchor="ctr"/>
-          <a:lstStyle/>
-          <a:p>
-            <a:pPr algn="ctr"/>
-            <a:r>
-              <a:rPr lang="hu-HU" dirty="0" err="1"/>
-              <a:t>BetTracker</a:t>
-            </a:r>
-            <a:r>
-              <a:rPr lang="hu-HU" dirty="0"/>
-              <a:t> v0.1</a:t>
-            </a:r>
-            <a:endParaRPr lang="en-US" dirty="0"/>
-          </a:p>
-        </p:txBody>
-      </p:sp>
-      <p:sp>
-        <p:nvSpPr>
-          <p:cNvPr id="6" name="Téglalap 5">
-            <a:extLst>
-              <a:ext uri="{FF2B5EF4-FFF2-40B4-BE49-F238E27FC236}">
-                <a16:creationId xmlns:a16="http://schemas.microsoft.com/office/drawing/2014/main" id="{9A81CC21-78CB-4ED3-9E4F-7E10116F92CA}"/>
-              </a:ext>
-            </a:extLst>
-          </p:cNvPr>
-          <p:cNvSpPr/>
-          <p:nvPr/>
-        </p:nvSpPr>
-        <p:spPr>
-          <a:xfrm>
-            <a:off x="1865376" y="2441448"/>
-            <a:ext cx="3474720" cy="658368"/>
-          </a:xfrm>
-          <a:prstGeom prst="rect">
+          <a:prstGeom prst="roundRect">
             <a:avLst/>
           </a:prstGeom>
         </p:spPr>
@@ -3521,26 +4261,96 @@
             <a:pPr algn="ctr"/>
             <a:r>
               <a:rPr lang="hu-HU" dirty="0" err="1"/>
-              <a:t>My</a:t>
-            </a:r>
-            <a:r>
-              <a:rPr lang="hu-HU" dirty="0"/>
-              <a:t> </a:t>
-            </a:r>
-            <a:r>
-              <a:rPr lang="hu-HU" dirty="0" err="1"/>
-              <a:t>bets</a:t>
+              <a:t>Bets</a:t>
             </a:r>
             <a:endParaRPr lang="en-US" dirty="0"/>
           </a:p>
         </p:txBody>
       </p:sp>
-      <p:sp>
-        <p:nvSpPr>
-          <p:cNvPr id="8" name="Téglalap 7">
-            <a:extLst>
-              <a:ext uri="{FF2B5EF4-FFF2-40B4-BE49-F238E27FC236}">
-                <a16:creationId xmlns:a16="http://schemas.microsoft.com/office/drawing/2014/main" id="{21A8A9B5-D712-4481-B08A-A383B715997E}"/>
+      <p:cxnSp>
+        <p:nvCxnSpPr>
+          <p:cNvPr id="11" name="Egyenes összekötő nyíllal 10">
+            <a:extLst>
+              <a:ext uri="{FF2B5EF4-FFF2-40B4-BE49-F238E27FC236}">
+                <a16:creationId xmlns:a16="http://schemas.microsoft.com/office/drawing/2014/main" id="{510019A0-454F-49C3-9DD2-0E05F841569B}"/>
+              </a:ext>
+            </a:extLst>
+          </p:cNvPr>
+          <p:cNvCxnSpPr/>
+          <p:nvPr/>
+        </p:nvCxnSpPr>
+        <p:spPr>
+          <a:xfrm>
+            <a:off x="4069080" y="4242816"/>
+            <a:ext cx="658368" cy="0"/>
+          </a:xfrm>
+          <a:prstGeom prst="straightConnector1">
+            <a:avLst/>
+          </a:prstGeom>
+          <a:ln>
+            <a:tailEnd type="triangle"/>
+          </a:ln>
+        </p:spPr>
+        <p:style>
+          <a:lnRef idx="1">
+            <a:schemeClr val="accent1"/>
+          </a:lnRef>
+          <a:fillRef idx="0">
+            <a:schemeClr val="accent1"/>
+          </a:fillRef>
+          <a:effectRef idx="0">
+            <a:schemeClr val="accent1"/>
+          </a:effectRef>
+          <a:fontRef idx="minor">
+            <a:schemeClr val="tx1"/>
+          </a:fontRef>
+        </p:style>
+      </p:cxnSp>
+      <p:cxnSp>
+        <p:nvCxnSpPr>
+          <p:cNvPr id="12" name="Egyenes összekötő nyíllal 11">
+            <a:extLst>
+              <a:ext uri="{FF2B5EF4-FFF2-40B4-BE49-F238E27FC236}">
+                <a16:creationId xmlns:a16="http://schemas.microsoft.com/office/drawing/2014/main" id="{998F4018-BBB1-4B19-A965-04494EC4096D}"/>
+              </a:ext>
+            </a:extLst>
+          </p:cNvPr>
+          <p:cNvCxnSpPr/>
+          <p:nvPr/>
+        </p:nvCxnSpPr>
+        <p:spPr>
+          <a:xfrm>
+            <a:off x="6105144" y="4242816"/>
+            <a:ext cx="658368" cy="0"/>
+          </a:xfrm>
+          <a:prstGeom prst="straightConnector1">
+            <a:avLst/>
+          </a:prstGeom>
+          <a:ln>
+            <a:tailEnd type="triangle"/>
+          </a:ln>
+        </p:spPr>
+        <p:style>
+          <a:lnRef idx="1">
+            <a:schemeClr val="accent1"/>
+          </a:lnRef>
+          <a:fillRef idx="0">
+            <a:schemeClr val="accent1"/>
+          </a:fillRef>
+          <a:effectRef idx="0">
+            <a:schemeClr val="accent1"/>
+          </a:effectRef>
+          <a:fontRef idx="minor">
+            <a:schemeClr val="tx1"/>
+          </a:fontRef>
+        </p:style>
+      </p:cxnSp>
+      <p:sp>
+        <p:nvSpPr>
+          <p:cNvPr id="15" name="Téglalap: lekerekített 14">
+            <a:extLst>
+              <a:ext uri="{FF2B5EF4-FFF2-40B4-BE49-F238E27FC236}">
+                <a16:creationId xmlns:a16="http://schemas.microsoft.com/office/drawing/2014/main" id="{400AE621-2095-41BA-9968-10A4A0369A70}"/>
               </a:ext>
             </a:extLst>
           </p:cNvPr>
@@ -3549,10 +4359,10 @@
         </p:nvSpPr>
         <p:spPr>
           <a:xfrm>
-            <a:off x="1865376" y="3090672"/>
-            <a:ext cx="3474720" cy="658368"/>
+            <a:off x="7065264" y="3529584"/>
+            <a:ext cx="969264" cy="1426464"/>
           </a:xfrm>
-          <a:prstGeom prst="rect">
+          <a:prstGeom prst="roundRect">
             <a:avLst/>
           </a:prstGeom>
         </p:spPr>
@@ -3579,66 +4389,40 @@
             <a:pPr algn="ctr"/>
             <a:r>
               <a:rPr lang="hu-HU" dirty="0" err="1"/>
-              <a:t>My</a:t>
-            </a:r>
-            <a:r>
+              <a:t>Bet</a:t>
+            </a:r>
+            <a:endParaRPr lang="hu-HU" dirty="0"/>
+          </a:p>
+        </p:txBody>
+      </p:sp>
+      <p:sp>
+        <p:nvSpPr>
+          <p:cNvPr id="16" name="Cím 15">
+            <a:extLst>
+              <a:ext uri="{FF2B5EF4-FFF2-40B4-BE49-F238E27FC236}">
+                <a16:creationId xmlns:a16="http://schemas.microsoft.com/office/drawing/2014/main" id="{43ED8DFA-9EDB-4D07-AE93-AB2EE1141462}"/>
+              </a:ext>
+            </a:extLst>
+          </p:cNvPr>
+          <p:cNvSpPr>
+            <a:spLocks noGrp="1"/>
+          </p:cNvSpPr>
+          <p:nvPr>
+            <p:ph type="ctrTitle"/>
+          </p:nvPr>
+        </p:nvSpPr>
+        <p:spPr/>
+        <p:txBody>
+          <a:bodyPr/>
+          <a:lstStyle/>
+          <a:p>
+            <a:r>
+              <a:rPr lang="hu-HU" dirty="0" err="1"/>
+              <a:t>Meta</a:t>
+            </a:r>
+            <a:br>
               <a:rPr lang="hu-HU" dirty="0"/>
-              <a:t> </a:t>
-            </a:r>
-            <a:r>
-              <a:rPr lang="hu-HU" dirty="0" err="1"/>
-              <a:t>statisics</a:t>
-            </a:r>
-            <a:endParaRPr lang="en-US" dirty="0"/>
-          </a:p>
-        </p:txBody>
-      </p:sp>
-      <p:sp>
-        <p:nvSpPr>
-          <p:cNvPr id="9" name="Téglalap 8">
-            <a:extLst>
-              <a:ext uri="{FF2B5EF4-FFF2-40B4-BE49-F238E27FC236}">
-                <a16:creationId xmlns:a16="http://schemas.microsoft.com/office/drawing/2014/main" id="{0E719DBE-72F6-4915-8CAA-42F5F6020D1E}"/>
-              </a:ext>
-            </a:extLst>
-          </p:cNvPr>
-          <p:cNvSpPr/>
-          <p:nvPr/>
-        </p:nvSpPr>
-        <p:spPr>
-          <a:xfrm>
-            <a:off x="1865376" y="3755659"/>
-            <a:ext cx="3474720" cy="658368"/>
-          </a:xfrm>
-          <a:prstGeom prst="rect">
-            <a:avLst/>
-          </a:prstGeom>
-        </p:spPr>
-        <p:style>
-          <a:lnRef idx="2">
-            <a:schemeClr val="accent1">
-              <a:shade val="50000"/>
-            </a:schemeClr>
-          </a:lnRef>
-          <a:fillRef idx="1">
-            <a:schemeClr val="accent1"/>
-          </a:fillRef>
-          <a:effectRef idx="0">
-            <a:schemeClr val="accent1"/>
-          </a:effectRef>
-          <a:fontRef idx="minor">
-            <a:schemeClr val="lt1"/>
-          </a:fontRef>
-        </p:style>
-        <p:txBody>
-          <a:bodyPr rtlCol="0" anchor="ctr"/>
-          <a:lstStyle/>
-          <a:p>
-            <a:pPr algn="ctr"/>
-            <a:r>
-              <a:rPr lang="hu-HU" dirty="0"/>
-              <a:t>Beállítások</a:t>
-            </a:r>
+            </a:br>
             <a:endParaRPr lang="en-US" dirty="0"/>
           </a:p>
         </p:txBody>
@@ -3646,7 +4430,7 @@
     </p:spTree>
     <p:extLst>
       <p:ext uri="{BB962C8B-B14F-4D97-AF65-F5344CB8AC3E}">
-        <p14:creationId xmlns:p14="http://schemas.microsoft.com/office/powerpoint/2010/main" val="2673481837"/>
+        <p14:creationId xmlns:p14="http://schemas.microsoft.com/office/powerpoint/2010/main" val="1976492205"/>
       </p:ext>
     </p:extLst>
   </p:cSld>
@@ -3675,62 +4459,53 @@
       </p:grpSpPr>
       <p:sp>
         <p:nvSpPr>
-          <p:cNvPr id="3" name="Alcím 2">
-            <a:extLst>
-              <a:ext uri="{FF2B5EF4-FFF2-40B4-BE49-F238E27FC236}">
-                <a16:creationId xmlns:a16="http://schemas.microsoft.com/office/drawing/2014/main" id="{6F4B8C3F-D313-43F9-82C1-5F0522C49FD3}"/>
-              </a:ext>
-            </a:extLst>
-          </p:cNvPr>
-          <p:cNvSpPr>
-            <a:spLocks noGrp="1"/>
-          </p:cNvSpPr>
-          <p:nvPr>
-            <p:ph type="subTitle" idx="1"/>
-          </p:nvPr>
+          <p:cNvPr id="2" name="Cím 1">
+            <a:extLst>
+              <a:ext uri="{FF2B5EF4-FFF2-40B4-BE49-F238E27FC236}">
+                <a16:creationId xmlns:a16="http://schemas.microsoft.com/office/drawing/2014/main" id="{3C05F290-5406-4269-86E8-2ADDA82118BA}"/>
+              </a:ext>
+            </a:extLst>
+          </p:cNvPr>
+          <p:cNvSpPr>
+            <a:spLocks noGrp="1"/>
+          </p:cNvSpPr>
+          <p:nvPr>
+            <p:ph type="title"/>
+          </p:nvPr>
+        </p:nvSpPr>
+        <p:spPr/>
+        <p:txBody>
+          <a:bodyPr/>
+          <a:lstStyle/>
+          <a:p>
+            <a:r>
+              <a:rPr lang="hu-HU" dirty="0"/>
+              <a:t>Main </a:t>
+            </a:r>
+            <a:r>
+              <a:rPr lang="hu-HU" dirty="0" err="1"/>
+              <a:t>nezet</a:t>
+            </a:r>
+            <a:endParaRPr lang="en-US" dirty="0"/>
+          </a:p>
+        </p:txBody>
+      </p:sp>
+      <p:sp>
+        <p:nvSpPr>
+          <p:cNvPr id="4" name="Téglalap 3">
+            <a:extLst>
+              <a:ext uri="{FF2B5EF4-FFF2-40B4-BE49-F238E27FC236}">
+                <a16:creationId xmlns:a16="http://schemas.microsoft.com/office/drawing/2014/main" id="{3EE99E1A-DC53-4D0E-A65B-098959359736}"/>
+              </a:ext>
+            </a:extLst>
+          </p:cNvPr>
+          <p:cNvSpPr/>
+          <p:nvPr/>
         </p:nvSpPr>
         <p:spPr>
           <a:xfrm>
-            <a:off x="999892" y="624663"/>
-            <a:ext cx="9144000" cy="1655762"/>
-          </a:xfrm>
-        </p:spPr>
-        <p:txBody>
-          <a:bodyPr/>
-          <a:lstStyle/>
-          <a:p>
-            <a:r>
-              <a:rPr lang="hu-HU" dirty="0" err="1"/>
-              <a:t>Bets</a:t>
-            </a:r>
-            <a:r>
-              <a:rPr lang="hu-HU" dirty="0"/>
-              <a:t> </a:t>
-            </a:r>
-            <a:r>
-              <a:rPr lang="hu-HU" dirty="0" err="1"/>
-              <a:t>nezet</a:t>
-            </a:r>
-            <a:endParaRPr lang="en-US" dirty="0"/>
-          </a:p>
-        </p:txBody>
-      </p:sp>
-      <p:sp>
-        <p:nvSpPr>
-          <p:cNvPr id="4" name="Téglalap 3">
-            <a:extLst>
-              <a:ext uri="{FF2B5EF4-FFF2-40B4-BE49-F238E27FC236}">
-                <a16:creationId xmlns:a16="http://schemas.microsoft.com/office/drawing/2014/main" id="{50B187FE-C62F-4DDD-882F-393DA8C48064}"/>
-              </a:ext>
-            </a:extLst>
-          </p:cNvPr>
-          <p:cNvSpPr/>
-          <p:nvPr/>
-        </p:nvSpPr>
-        <p:spPr>
-          <a:xfrm>
-            <a:off x="1884556" y="1137424"/>
-            <a:ext cx="3479181" cy="5296830"/>
+            <a:off x="1865376" y="1539970"/>
+            <a:ext cx="3474720" cy="4867783"/>
           </a:xfrm>
           <a:prstGeom prst="rect">
             <a:avLst/>
@@ -3757,7 +4532,7 @@
           <a:lstStyle/>
           <a:p>
             <a:pPr algn="ctr"/>
-            <a:endParaRPr lang="en-US" dirty="0"/>
+            <a:endParaRPr lang="en-US"/>
           </a:p>
         </p:txBody>
       </p:sp>
@@ -3766,7 +4541,7 @@
           <p:cNvPr id="5" name="Téglalap 4">
             <a:extLst>
               <a:ext uri="{FF2B5EF4-FFF2-40B4-BE49-F238E27FC236}">
-                <a16:creationId xmlns:a16="http://schemas.microsoft.com/office/drawing/2014/main" id="{E3E24E44-1B5D-4C93-8761-5AF69FD59065}"/>
+                <a16:creationId xmlns:a16="http://schemas.microsoft.com/office/drawing/2014/main" id="{8C51F31F-BE7A-4208-BFB9-CD7B28B8D0CC}"/>
               </a:ext>
             </a:extLst>
           </p:cNvPr>
@@ -3775,8 +4550,8 @@
         </p:nvSpPr>
         <p:spPr>
           <a:xfrm>
-            <a:off x="1884555" y="1137424"/>
-            <a:ext cx="3479181" cy="801104"/>
+            <a:off x="1865376" y="1539970"/>
+            <a:ext cx="3474720" cy="914400"/>
           </a:xfrm>
           <a:prstGeom prst="rect">
             <a:avLst/>
@@ -3805,15 +4580,11 @@
             <a:pPr algn="ctr"/>
             <a:r>
               <a:rPr lang="hu-HU" dirty="0" err="1"/>
-              <a:t>My</a:t>
+              <a:t>BetTracker</a:t>
             </a:r>
             <a:r>
               <a:rPr lang="hu-HU" dirty="0"/>
-              <a:t> </a:t>
-            </a:r>
-            <a:r>
-              <a:rPr lang="hu-HU" dirty="0" err="1"/>
-              <a:t>bets</a:t>
+              <a:t> v0.1</a:t>
             </a:r>
             <a:endParaRPr lang="en-US" dirty="0"/>
           </a:p>
@@ -3824,7 +4595,7 @@
           <p:cNvPr id="6" name="Téglalap 5">
             <a:extLst>
               <a:ext uri="{FF2B5EF4-FFF2-40B4-BE49-F238E27FC236}">
-                <a16:creationId xmlns:a16="http://schemas.microsoft.com/office/drawing/2014/main" id="{ACBA9A13-011B-418C-882B-A9C6388FE108}"/>
+                <a16:creationId xmlns:a16="http://schemas.microsoft.com/office/drawing/2014/main" id="{9A81CC21-78CB-4ED3-9E4F-7E10116F92CA}"/>
               </a:ext>
             </a:extLst>
           </p:cNvPr>
@@ -3833,8 +4604,8 @@
         </p:nvSpPr>
         <p:spPr>
           <a:xfrm>
-            <a:off x="1884555" y="1975104"/>
-            <a:ext cx="3479181" cy="4459150"/>
+            <a:off x="1865376" y="2441448"/>
+            <a:ext cx="3474720" cy="658368"/>
           </a:xfrm>
           <a:prstGeom prst="rect">
             <a:avLst/>
@@ -3862,8 +4633,16 @@
           <a:p>
             <a:pPr algn="ctr"/>
             <a:r>
+              <a:rPr lang="hu-HU" dirty="0" err="1"/>
+              <a:t>My</a:t>
+            </a:r>
+            <a:r>
               <a:rPr lang="hu-HU" dirty="0"/>
-              <a:t>Lista</a:t>
+              <a:t> </a:t>
+            </a:r>
+            <a:r>
+              <a:rPr lang="hu-HU" dirty="0" err="1"/>
+              <a:t>bets</a:t>
             </a:r>
             <a:endParaRPr lang="en-US" dirty="0"/>
           </a:p>
@@ -3871,10 +4650,10 @@
       </p:sp>
       <p:sp>
         <p:nvSpPr>
-          <p:cNvPr id="7" name="Téglalap 6">
-            <a:extLst>
-              <a:ext uri="{FF2B5EF4-FFF2-40B4-BE49-F238E27FC236}">
-                <a16:creationId xmlns:a16="http://schemas.microsoft.com/office/drawing/2014/main" id="{EFD1726B-7DD9-4BC1-A42F-7E7BD4C6521A}"/>
+          <p:cNvPr id="8" name="Téglalap 7">
+            <a:extLst>
+              <a:ext uri="{FF2B5EF4-FFF2-40B4-BE49-F238E27FC236}">
+                <a16:creationId xmlns:a16="http://schemas.microsoft.com/office/drawing/2014/main" id="{21A8A9B5-D712-4481-B08A-A383B715997E}"/>
               </a:ext>
             </a:extLst>
           </p:cNvPr>
@@ -3883,8 +4662,8 @@
         </p:nvSpPr>
         <p:spPr>
           <a:xfrm>
-            <a:off x="1884555" y="1938528"/>
-            <a:ext cx="3479181" cy="801104"/>
+            <a:off x="1865376" y="3090672"/>
+            <a:ext cx="3474720" cy="658368"/>
           </a:xfrm>
           <a:prstGeom prst="rect">
             <a:avLst/>
@@ -3892,15 +4671,15 @@
         </p:spPr>
         <p:style>
           <a:lnRef idx="2">
-            <a:schemeClr val="accent4">
+            <a:schemeClr val="accent1">
               <a:shade val="50000"/>
             </a:schemeClr>
           </a:lnRef>
           <a:fillRef idx="1">
-            <a:schemeClr val="accent4"/>
+            <a:schemeClr val="accent1"/>
           </a:fillRef>
           <a:effectRef idx="0">
-            <a:schemeClr val="accent4"/>
+            <a:schemeClr val="accent1"/>
           </a:effectRef>
           <a:fontRef idx="minor">
             <a:schemeClr val="lt1"/>
@@ -3913,11 +4692,15 @@
             <a:pPr algn="ctr"/>
             <a:r>
               <a:rPr lang="hu-HU" dirty="0" err="1"/>
-              <a:t>Bet</a:t>
+              <a:t>My</a:t>
             </a:r>
             <a:r>
               <a:rPr lang="hu-HU" dirty="0"/>
-              <a:t> 1</a:t>
+              <a:t> </a:t>
+            </a:r>
+            <a:r>
+              <a:rPr lang="hu-HU" dirty="0" err="1"/>
+              <a:t>statisics</a:t>
             </a:r>
             <a:endParaRPr lang="en-US" dirty="0"/>
           </a:p>
@@ -3925,10 +4708,10 @@
       </p:sp>
       <p:sp>
         <p:nvSpPr>
-          <p:cNvPr id="8" name="Téglalap 7">
-            <a:extLst>
-              <a:ext uri="{FF2B5EF4-FFF2-40B4-BE49-F238E27FC236}">
-                <a16:creationId xmlns:a16="http://schemas.microsoft.com/office/drawing/2014/main" id="{3DAEBDD5-EC91-4D56-8D72-4E9D2E36B303}"/>
+          <p:cNvPr id="9" name="Téglalap 8">
+            <a:extLst>
+              <a:ext uri="{FF2B5EF4-FFF2-40B4-BE49-F238E27FC236}">
+                <a16:creationId xmlns:a16="http://schemas.microsoft.com/office/drawing/2014/main" id="{0E719DBE-72F6-4915-8CAA-42F5F6020D1E}"/>
               </a:ext>
             </a:extLst>
           </p:cNvPr>
@@ -3937,8 +4720,8 @@
         </p:nvSpPr>
         <p:spPr>
           <a:xfrm>
-            <a:off x="1884555" y="2748163"/>
-            <a:ext cx="3479181" cy="801104"/>
+            <a:off x="1865376" y="3755659"/>
+            <a:ext cx="3474720" cy="658368"/>
           </a:xfrm>
           <a:prstGeom prst="rect">
             <a:avLst/>
@@ -3946,15 +4729,15 @@
         </p:spPr>
         <p:style>
           <a:lnRef idx="2">
-            <a:schemeClr val="accent2">
+            <a:schemeClr val="accent1">
               <a:shade val="50000"/>
             </a:schemeClr>
           </a:lnRef>
           <a:fillRef idx="1">
-            <a:schemeClr val="accent2"/>
+            <a:schemeClr val="accent1"/>
           </a:fillRef>
           <a:effectRef idx="0">
-            <a:schemeClr val="accent2"/>
+            <a:schemeClr val="accent1"/>
           </a:effectRef>
           <a:fontRef idx="minor">
             <a:schemeClr val="lt1"/>
@@ -3966,23 +4749,58 @@
           <a:p>
             <a:pPr algn="ctr"/>
             <a:r>
-              <a:rPr lang="hu-HU" dirty="0" err="1"/>
-              <a:t>Bet</a:t>
-            </a:r>
-            <a:r>
               <a:rPr lang="hu-HU" dirty="0"/>
-              <a:t> 2</a:t>
+              <a:t>Beállítások</a:t>
             </a:r>
             <a:endParaRPr lang="en-US" dirty="0"/>
           </a:p>
         </p:txBody>
       </p:sp>
-      <p:sp>
-        <p:nvSpPr>
-          <p:cNvPr id="9" name="Téglalap 8">
-            <a:extLst>
-              <a:ext uri="{FF2B5EF4-FFF2-40B4-BE49-F238E27FC236}">
-                <a16:creationId xmlns:a16="http://schemas.microsoft.com/office/drawing/2014/main" id="{5EE5A30E-4986-4D87-9471-FF64B982F5B9}"/>
+      <p:cxnSp>
+        <p:nvCxnSpPr>
+          <p:cNvPr id="7" name="Egyenes összekötő nyíllal 6">
+            <a:extLst>
+              <a:ext uri="{FF2B5EF4-FFF2-40B4-BE49-F238E27FC236}">
+                <a16:creationId xmlns:a16="http://schemas.microsoft.com/office/drawing/2014/main" id="{4436AA83-7FBC-4FD3-90FE-F3FB69D4E89B}"/>
+              </a:ext>
+            </a:extLst>
+          </p:cNvPr>
+          <p:cNvCxnSpPr/>
+          <p:nvPr/>
+        </p:nvCxnSpPr>
+        <p:spPr>
+          <a:xfrm>
+            <a:off x="4910328" y="2834640"/>
+            <a:ext cx="2624328" cy="64008"/>
+          </a:xfrm>
+          <a:prstGeom prst="straightConnector1">
+            <a:avLst/>
+          </a:prstGeom>
+          <a:ln>
+            <a:tailEnd type="triangle"/>
+          </a:ln>
+        </p:spPr>
+        <p:style>
+          <a:lnRef idx="1">
+            <a:schemeClr val="accent1"/>
+          </a:lnRef>
+          <a:fillRef idx="0">
+            <a:schemeClr val="accent1"/>
+          </a:fillRef>
+          <a:effectRef idx="0">
+            <a:schemeClr val="accent1"/>
+          </a:effectRef>
+          <a:fontRef idx="minor">
+            <a:schemeClr val="tx1"/>
+          </a:fontRef>
+        </p:style>
+      </p:cxnSp>
+      <p:sp>
+        <p:nvSpPr>
+          <p:cNvPr id="10" name="Téglalap 9">
+            <a:extLst>
+              <a:ext uri="{FF2B5EF4-FFF2-40B4-BE49-F238E27FC236}">
+                <a16:creationId xmlns:a16="http://schemas.microsoft.com/office/drawing/2014/main" id="{9D6AC112-33DB-4908-B69E-94ED15133585}"/>
               </a:ext>
             </a:extLst>
           </p:cNvPr>
@@ -3991,8 +4809,8 @@
         </p:nvSpPr>
         <p:spPr>
           <a:xfrm>
-            <a:off x="1884555" y="3557798"/>
-            <a:ext cx="3479181" cy="801104"/>
+            <a:off x="8065008" y="2578608"/>
+            <a:ext cx="2261616" cy="521208"/>
           </a:xfrm>
           <a:prstGeom prst="rect">
             <a:avLst/>
@@ -4000,15 +4818,15 @@
         </p:spPr>
         <p:style>
           <a:lnRef idx="2">
-            <a:schemeClr val="accent4">
+            <a:schemeClr val="accent1">
               <a:shade val="50000"/>
             </a:schemeClr>
           </a:lnRef>
           <a:fillRef idx="1">
-            <a:schemeClr val="accent4"/>
+            <a:schemeClr val="accent1"/>
           </a:fillRef>
           <a:effectRef idx="0">
-            <a:schemeClr val="accent4"/>
+            <a:schemeClr val="accent1"/>
           </a:effectRef>
           <a:fontRef idx="minor">
             <a:schemeClr val="lt1"/>
@@ -4021,22 +4839,120 @@
             <a:pPr algn="ctr"/>
             <a:r>
               <a:rPr lang="hu-HU" dirty="0" err="1"/>
-              <a:t>Bet</a:t>
+              <a:t>Goes</a:t>
             </a:r>
             <a:r>
               <a:rPr lang="hu-HU" dirty="0"/>
-              <a:t> 3</a:t>
+              <a:t> </a:t>
+            </a:r>
+            <a:r>
+              <a:rPr lang="hu-HU" dirty="0" err="1"/>
+              <a:t>to</a:t>
+            </a:r>
+            <a:r>
+              <a:rPr lang="hu-HU" dirty="0"/>
+              <a:t> </a:t>
+            </a:r>
+            <a:r>
+              <a:rPr lang="hu-HU" dirty="0" err="1"/>
+              <a:t>bets</a:t>
+            </a:r>
+            <a:r>
+              <a:rPr lang="hu-HU" dirty="0"/>
+              <a:t> </a:t>
+            </a:r>
+            <a:r>
+              <a:rPr lang="hu-HU" dirty="0" err="1"/>
+              <a:t>nezet</a:t>
             </a:r>
             <a:endParaRPr lang="en-US" dirty="0"/>
           </a:p>
         </p:txBody>
       </p:sp>
-      <p:sp>
-        <p:nvSpPr>
-          <p:cNvPr id="10" name="Téglalap 9">
-            <a:extLst>
-              <a:ext uri="{FF2B5EF4-FFF2-40B4-BE49-F238E27FC236}">
-                <a16:creationId xmlns:a16="http://schemas.microsoft.com/office/drawing/2014/main" id="{1E583A77-269F-4C88-917E-3DB46F7E2279}"/>
+      <p:cxnSp>
+        <p:nvCxnSpPr>
+          <p:cNvPr id="11" name="Egyenes összekötő nyíllal 10">
+            <a:extLst>
+              <a:ext uri="{FF2B5EF4-FFF2-40B4-BE49-F238E27FC236}">
+                <a16:creationId xmlns:a16="http://schemas.microsoft.com/office/drawing/2014/main" id="{5D44895D-6D9E-457F-A3AF-E8C393E27E71}"/>
+              </a:ext>
+            </a:extLst>
+          </p:cNvPr>
+          <p:cNvCxnSpPr/>
+          <p:nvPr/>
+        </p:nvCxnSpPr>
+        <p:spPr>
+          <a:xfrm>
+            <a:off x="4783836" y="3480086"/>
+            <a:ext cx="2624328" cy="64008"/>
+          </a:xfrm>
+          <a:prstGeom prst="straightConnector1">
+            <a:avLst/>
+          </a:prstGeom>
+          <a:ln>
+            <a:tailEnd type="triangle"/>
+          </a:ln>
+        </p:spPr>
+        <p:style>
+          <a:lnRef idx="1">
+            <a:schemeClr val="accent1"/>
+          </a:lnRef>
+          <a:fillRef idx="0">
+            <a:schemeClr val="accent1"/>
+          </a:fillRef>
+          <a:effectRef idx="0">
+            <a:schemeClr val="accent1"/>
+          </a:effectRef>
+          <a:fontRef idx="minor">
+            <a:schemeClr val="tx1"/>
+          </a:fontRef>
+        </p:style>
+      </p:cxnSp>
+      <p:cxnSp>
+        <p:nvCxnSpPr>
+          <p:cNvPr id="12" name="Egyenes összekötő nyíllal 11">
+            <a:extLst>
+              <a:ext uri="{FF2B5EF4-FFF2-40B4-BE49-F238E27FC236}">
+                <a16:creationId xmlns:a16="http://schemas.microsoft.com/office/drawing/2014/main" id="{AEF9D568-AF84-423E-8D74-15D821A737F0}"/>
+              </a:ext>
+            </a:extLst>
+          </p:cNvPr>
+          <p:cNvCxnSpPr/>
+          <p:nvPr/>
+        </p:nvCxnSpPr>
+        <p:spPr>
+          <a:xfrm>
+            <a:off x="4783836" y="4149645"/>
+            <a:ext cx="2624328" cy="64008"/>
+          </a:xfrm>
+          <a:prstGeom prst="straightConnector1">
+            <a:avLst/>
+          </a:prstGeom>
+          <a:ln>
+            <a:tailEnd type="triangle"/>
+          </a:ln>
+        </p:spPr>
+        <p:style>
+          <a:lnRef idx="1">
+            <a:schemeClr val="accent1"/>
+          </a:lnRef>
+          <a:fillRef idx="0">
+            <a:schemeClr val="accent1"/>
+          </a:fillRef>
+          <a:effectRef idx="0">
+            <a:schemeClr val="accent1"/>
+          </a:effectRef>
+          <a:fontRef idx="minor">
+            <a:schemeClr val="tx1"/>
+          </a:fontRef>
+        </p:style>
+      </p:cxnSp>
+      <p:sp>
+        <p:nvSpPr>
+          <p:cNvPr id="13" name="Téglalap 12">
+            <a:extLst>
+              <a:ext uri="{FF2B5EF4-FFF2-40B4-BE49-F238E27FC236}">
+                <a16:creationId xmlns:a16="http://schemas.microsoft.com/office/drawing/2014/main" id="{CFEE1395-6957-4221-8638-E77832712352}"/>
               </a:ext>
             </a:extLst>
           </p:cNvPr>
@@ -4045,8 +4961,8 @@
         </p:nvSpPr>
         <p:spPr>
           <a:xfrm>
-            <a:off x="1884555" y="4367433"/>
-            <a:ext cx="3479181" cy="801104"/>
+            <a:off x="8065008" y="3251486"/>
+            <a:ext cx="2261616" cy="521208"/>
           </a:xfrm>
           <a:prstGeom prst="rect">
             <a:avLst/>
@@ -4054,15 +4970,15 @@
         </p:spPr>
         <p:style>
           <a:lnRef idx="2">
-            <a:schemeClr val="accent2">
+            <a:schemeClr val="accent1">
               <a:shade val="50000"/>
             </a:schemeClr>
           </a:lnRef>
           <a:fillRef idx="1">
-            <a:schemeClr val="accent2"/>
+            <a:schemeClr val="accent1"/>
           </a:fillRef>
           <a:effectRef idx="0">
-            <a:schemeClr val="accent2"/>
+            <a:schemeClr val="accent1"/>
           </a:effectRef>
           <a:fontRef idx="minor">
             <a:schemeClr val="lt1"/>
@@ -4075,11 +4991,31 @@
             <a:pPr algn="ctr"/>
             <a:r>
               <a:rPr lang="hu-HU" dirty="0" err="1"/>
-              <a:t>Bet</a:t>
+              <a:t>Goes</a:t>
             </a:r>
             <a:r>
               <a:rPr lang="hu-HU" dirty="0"/>
-              <a:t> 4</a:t>
+              <a:t> </a:t>
+            </a:r>
+            <a:r>
+              <a:rPr lang="hu-HU" dirty="0" err="1"/>
+              <a:t>to</a:t>
+            </a:r>
+            <a:r>
+              <a:rPr lang="hu-HU" dirty="0"/>
+              <a:t> </a:t>
+            </a:r>
+            <a:r>
+              <a:rPr lang="hu-HU" dirty="0" err="1"/>
+              <a:t>Stat</a:t>
+            </a:r>
+            <a:r>
+              <a:rPr lang="hu-HU" dirty="0"/>
+              <a:t> </a:t>
+            </a:r>
+            <a:r>
+              <a:rPr lang="hu-HU" dirty="0" err="1"/>
+              <a:t>nezet</a:t>
             </a:r>
             <a:endParaRPr lang="en-US" dirty="0"/>
           </a:p>
@@ -4087,10 +5023,10 @@
       </p:sp>
       <p:sp>
         <p:nvSpPr>
-          <p:cNvPr id="11" name="Téglalap 10">
-            <a:extLst>
-              <a:ext uri="{FF2B5EF4-FFF2-40B4-BE49-F238E27FC236}">
-                <a16:creationId xmlns:a16="http://schemas.microsoft.com/office/drawing/2014/main" id="{02176900-1F1C-4C85-BA31-47162767EA00}"/>
+          <p:cNvPr id="14" name="Téglalap 13">
+            <a:extLst>
+              <a:ext uri="{FF2B5EF4-FFF2-40B4-BE49-F238E27FC236}">
+                <a16:creationId xmlns:a16="http://schemas.microsoft.com/office/drawing/2014/main" id="{DE373BE0-75F0-49B5-BE97-CDEDF6CE72D4}"/>
               </a:ext>
             </a:extLst>
           </p:cNvPr>
@@ -4099,8 +5035,8 @@
         </p:nvSpPr>
         <p:spPr>
           <a:xfrm>
-            <a:off x="1884555" y="5168537"/>
-            <a:ext cx="3479181" cy="801104"/>
+            <a:off x="8065008" y="3987736"/>
+            <a:ext cx="2261616" cy="521208"/>
           </a:xfrm>
           <a:prstGeom prst="rect">
             <a:avLst/>
@@ -4108,15 +5044,15 @@
         </p:spPr>
         <p:style>
           <a:lnRef idx="2">
-            <a:schemeClr val="accent4">
+            <a:schemeClr val="accent1">
               <a:shade val="50000"/>
             </a:schemeClr>
           </a:lnRef>
           <a:fillRef idx="1">
-            <a:schemeClr val="accent4"/>
+            <a:schemeClr val="accent1"/>
           </a:fillRef>
           <a:effectRef idx="0">
-            <a:schemeClr val="accent4"/>
+            <a:schemeClr val="accent1"/>
           </a:effectRef>
           <a:fontRef idx="minor">
             <a:schemeClr val="lt1"/>
@@ -4127,59 +5063,9 @@
           <a:lstStyle/>
           <a:p>
             <a:pPr algn="ctr"/>
-            <a:endParaRPr lang="en-US"/>
-          </a:p>
-        </p:txBody>
-      </p:sp>
-      <p:sp>
-        <p:nvSpPr>
-          <p:cNvPr id="12" name="Téglalap 11">
-            <a:extLst>
-              <a:ext uri="{FF2B5EF4-FFF2-40B4-BE49-F238E27FC236}">
-                <a16:creationId xmlns:a16="http://schemas.microsoft.com/office/drawing/2014/main" id="{1C200257-6D8C-4682-94BF-EBB16DB11D82}"/>
-              </a:ext>
-            </a:extLst>
-          </p:cNvPr>
-          <p:cNvSpPr/>
-          <p:nvPr/>
-        </p:nvSpPr>
-        <p:spPr>
-          <a:xfrm>
-            <a:off x="5797296" y="1839339"/>
-            <a:ext cx="2523744" cy="914400"/>
-          </a:xfrm>
-          <a:prstGeom prst="rect">
-            <a:avLst/>
-          </a:prstGeom>
-        </p:spPr>
-        <p:style>
-          <a:lnRef idx="2">
-            <a:schemeClr val="accent3">
-              <a:shade val="50000"/>
-            </a:schemeClr>
-          </a:lnRef>
-          <a:fillRef idx="1">
-            <a:schemeClr val="accent3"/>
-          </a:fillRef>
-          <a:effectRef idx="0">
-            <a:schemeClr val="accent3"/>
-          </a:effectRef>
-          <a:fontRef idx="minor">
-            <a:schemeClr val="lt1"/>
-          </a:fontRef>
-        </p:style>
-        <p:txBody>
-          <a:bodyPr rtlCol="0" anchor="ctr"/>
-          <a:lstStyle/>
-          <a:p>
-            <a:pPr algn="ctr"/>
-            <a:r>
-              <a:rPr lang="hu-HU" dirty="0"/>
-              <a:t>Szinek itt a </a:t>
-            </a:r>
             <a:r>
               <a:rPr lang="hu-HU" dirty="0" err="1"/>
-              <a:t>hatarido</a:t>
+              <a:t>Goes</a:t>
             </a:r>
             <a:r>
               <a:rPr lang="hu-HU" dirty="0"/>
@@ -4187,11 +5073,23 @@
             </a:r>
             <a:r>
               <a:rPr lang="hu-HU" dirty="0" err="1"/>
-              <a:t>gyakorisagat</a:t>
+              <a:t>to</a:t>
             </a:r>
             <a:r>
               <a:rPr lang="hu-HU" dirty="0"/>
-              <a:t> mutatja</a:t>
+              <a:t> </a:t>
+            </a:r>
+            <a:r>
+              <a:rPr lang="hu-HU" dirty="0" err="1"/>
+              <a:t>settings</a:t>
+            </a:r>
+            <a:r>
+              <a:rPr lang="hu-HU" dirty="0"/>
+              <a:t> </a:t>
+            </a:r>
+            <a:r>
+              <a:rPr lang="hu-HU" dirty="0" err="1"/>
+              <a:t>nezet</a:t>
             </a:r>
             <a:endParaRPr lang="en-US" dirty="0"/>
           </a:p>
@@ -4200,7 +5098,7 @@
     </p:spTree>
     <p:extLst>
       <p:ext uri="{BB962C8B-B14F-4D97-AF65-F5344CB8AC3E}">
-        <p14:creationId xmlns:p14="http://schemas.microsoft.com/office/powerpoint/2010/main" val="3770477475"/>
+        <p14:creationId xmlns:p14="http://schemas.microsoft.com/office/powerpoint/2010/main" val="2673481837"/>
       </p:ext>
     </p:extLst>
   </p:cSld>
@@ -4229,38 +5127,41 @@
       </p:grpSpPr>
       <p:sp>
         <p:nvSpPr>
-          <p:cNvPr id="2" name="Cím 1">
-            <a:extLst>
-              <a:ext uri="{FF2B5EF4-FFF2-40B4-BE49-F238E27FC236}">
-                <a16:creationId xmlns:a16="http://schemas.microsoft.com/office/drawing/2014/main" id="{594A4525-F6B4-4220-9B8E-E1B07188CAE5}"/>
-              </a:ext>
-            </a:extLst>
-          </p:cNvPr>
-          <p:cNvSpPr>
-            <a:spLocks noGrp="1"/>
-          </p:cNvSpPr>
-          <p:nvPr>
-            <p:ph type="title"/>
+          <p:cNvPr id="3" name="Alcím 2">
+            <a:extLst>
+              <a:ext uri="{FF2B5EF4-FFF2-40B4-BE49-F238E27FC236}">
+                <a16:creationId xmlns:a16="http://schemas.microsoft.com/office/drawing/2014/main" id="{6F4B8C3F-D313-43F9-82C1-5F0522C49FD3}"/>
+              </a:ext>
+            </a:extLst>
+          </p:cNvPr>
+          <p:cNvSpPr>
+            <a:spLocks noGrp="1"/>
+          </p:cNvSpPr>
+          <p:nvPr>
+            <p:ph type="subTitle" idx="1"/>
           </p:nvPr>
         </p:nvSpPr>
         <p:spPr>
           <a:xfrm>
-            <a:off x="1719817" y="456355"/>
-            <a:ext cx="10515600" cy="1325563"/>
+            <a:off x="999892" y="624663"/>
+            <a:ext cx="9144000" cy="1655762"/>
           </a:xfrm>
         </p:spPr>
         <p:txBody>
           <a:bodyPr/>
           <a:lstStyle/>
           <a:p>
-            <a:pPr algn="ctr"/>
             <a:r>
               <a:rPr lang="hu-HU" dirty="0" err="1"/>
-              <a:t>Bet</a:t>
+              <a:t>Bets</a:t>
             </a:r>
             <a:r>
               <a:rPr lang="hu-HU" dirty="0"/>
-              <a:t> nézet</a:t>
+              <a:t> </a:t>
+            </a:r>
+            <a:r>
+              <a:rPr lang="hu-HU" dirty="0" err="1"/>
+              <a:t>nezet</a:t>
             </a:r>
             <a:endParaRPr lang="en-US" dirty="0"/>
           </a:p>
@@ -4271,7 +5172,7 @@
           <p:cNvPr id="4" name="Téglalap 3">
             <a:extLst>
               <a:ext uri="{FF2B5EF4-FFF2-40B4-BE49-F238E27FC236}">
-                <a16:creationId xmlns:a16="http://schemas.microsoft.com/office/drawing/2014/main" id="{19E9C0B5-5DC3-4034-B4A5-1633991AC59F}"/>
+                <a16:creationId xmlns:a16="http://schemas.microsoft.com/office/drawing/2014/main" id="{50B187FE-C62F-4DDD-882F-393DA8C48064}"/>
               </a:ext>
             </a:extLst>
           </p:cNvPr>
@@ -4317,7 +5218,7 @@
           <p:cNvPr id="5" name="Téglalap 4">
             <a:extLst>
               <a:ext uri="{FF2B5EF4-FFF2-40B4-BE49-F238E27FC236}">
-                <a16:creationId xmlns:a16="http://schemas.microsoft.com/office/drawing/2014/main" id="{368C9006-7B65-4472-BE6C-60C8E4C27085}"/>
+                <a16:creationId xmlns:a16="http://schemas.microsoft.com/office/drawing/2014/main" id="{E3E24E44-1B5D-4C93-8761-5AF69FD59065}"/>
               </a:ext>
             </a:extLst>
           </p:cNvPr>
@@ -4356,11 +5257,15 @@
             <a:pPr algn="ctr"/>
             <a:r>
               <a:rPr lang="hu-HU" dirty="0" err="1"/>
-              <a:t>Bet</a:t>
+              <a:t>My</a:t>
             </a:r>
             <a:r>
               <a:rPr lang="hu-HU" dirty="0"/>
-              <a:t> 1</a:t>
+              <a:t> </a:t>
+            </a:r>
+            <a:r>
+              <a:rPr lang="hu-HU" dirty="0" err="1"/>
+              <a:t>bets</a:t>
             </a:r>
             <a:endParaRPr lang="en-US" dirty="0"/>
           </a:p>
@@ -4371,7 +5276,7 @@
           <p:cNvPr id="6" name="Téglalap 5">
             <a:extLst>
               <a:ext uri="{FF2B5EF4-FFF2-40B4-BE49-F238E27FC236}">
-                <a16:creationId xmlns:a16="http://schemas.microsoft.com/office/drawing/2014/main" id="{18B2E508-7CD4-42E0-9407-4F3AABD95E6F}"/>
+                <a16:creationId xmlns:a16="http://schemas.microsoft.com/office/drawing/2014/main" id="{ACBA9A13-011B-418C-882B-A9C6388FE108}"/>
               </a:ext>
             </a:extLst>
           </p:cNvPr>
@@ -4410,7 +5315,7 @@
             <a:pPr algn="ctr"/>
             <a:r>
               <a:rPr lang="hu-HU" dirty="0"/>
-              <a:t>Lista az emberekről</a:t>
+              <a:t>Lista</a:t>
             </a:r>
             <a:endParaRPr lang="en-US" dirty="0"/>
           </a:p>
@@ -4418,10 +5323,10 @@
       </p:sp>
       <p:sp>
         <p:nvSpPr>
-          <p:cNvPr id="11" name="Téglalap 10">
-            <a:extLst>
-              <a:ext uri="{FF2B5EF4-FFF2-40B4-BE49-F238E27FC236}">
-                <a16:creationId xmlns:a16="http://schemas.microsoft.com/office/drawing/2014/main" id="{C1E1C5CA-5BFE-498C-8CA7-C716E727B147}"/>
+          <p:cNvPr id="7" name="Téglalap 6">
+            <a:extLst>
+              <a:ext uri="{FF2B5EF4-FFF2-40B4-BE49-F238E27FC236}">
+                <a16:creationId xmlns:a16="http://schemas.microsoft.com/office/drawing/2014/main" id="{EFD1726B-7DD9-4BC1-A42F-7E7BD4C6521A}"/>
               </a:ext>
             </a:extLst>
           </p:cNvPr>
@@ -4459,6 +5364,553 @@
           <a:p>
             <a:pPr algn="ctr"/>
             <a:r>
+              <a:rPr lang="hu-HU" dirty="0" err="1"/>
+              <a:t>Bet</a:t>
+            </a:r>
+            <a:r>
+              <a:rPr lang="hu-HU" dirty="0"/>
+              <a:t> 1</a:t>
+            </a:r>
+            <a:endParaRPr lang="en-US" dirty="0"/>
+          </a:p>
+        </p:txBody>
+      </p:sp>
+      <p:sp>
+        <p:nvSpPr>
+          <p:cNvPr id="8" name="Téglalap 7">
+            <a:extLst>
+              <a:ext uri="{FF2B5EF4-FFF2-40B4-BE49-F238E27FC236}">
+                <a16:creationId xmlns:a16="http://schemas.microsoft.com/office/drawing/2014/main" id="{3DAEBDD5-EC91-4D56-8D72-4E9D2E36B303}"/>
+              </a:ext>
+            </a:extLst>
+          </p:cNvPr>
+          <p:cNvSpPr/>
+          <p:nvPr/>
+        </p:nvSpPr>
+        <p:spPr>
+          <a:xfrm>
+            <a:off x="1884555" y="2748163"/>
+            <a:ext cx="3479181" cy="801104"/>
+          </a:xfrm>
+          <a:prstGeom prst="rect">
+            <a:avLst/>
+          </a:prstGeom>
+        </p:spPr>
+        <p:style>
+          <a:lnRef idx="2">
+            <a:schemeClr val="accent2">
+              <a:shade val="50000"/>
+            </a:schemeClr>
+          </a:lnRef>
+          <a:fillRef idx="1">
+            <a:schemeClr val="accent2"/>
+          </a:fillRef>
+          <a:effectRef idx="0">
+            <a:schemeClr val="accent2"/>
+          </a:effectRef>
+          <a:fontRef idx="minor">
+            <a:schemeClr val="lt1"/>
+          </a:fontRef>
+        </p:style>
+        <p:txBody>
+          <a:bodyPr rtlCol="0" anchor="ctr"/>
+          <a:lstStyle/>
+          <a:p>
+            <a:pPr algn="ctr"/>
+            <a:r>
+              <a:rPr lang="hu-HU" dirty="0" err="1"/>
+              <a:t>Bet</a:t>
+            </a:r>
+            <a:r>
+              <a:rPr lang="hu-HU" dirty="0"/>
+              <a:t> 2</a:t>
+            </a:r>
+            <a:endParaRPr lang="en-US" dirty="0"/>
+          </a:p>
+        </p:txBody>
+      </p:sp>
+      <p:sp>
+        <p:nvSpPr>
+          <p:cNvPr id="9" name="Téglalap 8">
+            <a:extLst>
+              <a:ext uri="{FF2B5EF4-FFF2-40B4-BE49-F238E27FC236}">
+                <a16:creationId xmlns:a16="http://schemas.microsoft.com/office/drawing/2014/main" id="{5EE5A30E-4986-4D87-9471-FF64B982F5B9}"/>
+              </a:ext>
+            </a:extLst>
+          </p:cNvPr>
+          <p:cNvSpPr/>
+          <p:nvPr/>
+        </p:nvSpPr>
+        <p:spPr>
+          <a:xfrm>
+            <a:off x="1884555" y="3557798"/>
+            <a:ext cx="3479181" cy="801104"/>
+          </a:xfrm>
+          <a:prstGeom prst="rect">
+            <a:avLst/>
+          </a:prstGeom>
+        </p:spPr>
+        <p:style>
+          <a:lnRef idx="2">
+            <a:schemeClr val="accent4">
+              <a:shade val="50000"/>
+            </a:schemeClr>
+          </a:lnRef>
+          <a:fillRef idx="1">
+            <a:schemeClr val="accent4"/>
+          </a:fillRef>
+          <a:effectRef idx="0">
+            <a:schemeClr val="accent4"/>
+          </a:effectRef>
+          <a:fontRef idx="minor">
+            <a:schemeClr val="lt1"/>
+          </a:fontRef>
+        </p:style>
+        <p:txBody>
+          <a:bodyPr rtlCol="0" anchor="ctr"/>
+          <a:lstStyle/>
+          <a:p>
+            <a:pPr algn="ctr"/>
+            <a:r>
+              <a:rPr lang="hu-HU" dirty="0" err="1"/>
+              <a:t>Bet</a:t>
+            </a:r>
+            <a:r>
+              <a:rPr lang="hu-HU" dirty="0"/>
+              <a:t> 3</a:t>
+            </a:r>
+            <a:endParaRPr lang="en-US" dirty="0"/>
+          </a:p>
+        </p:txBody>
+      </p:sp>
+      <p:sp>
+        <p:nvSpPr>
+          <p:cNvPr id="10" name="Téglalap 9">
+            <a:extLst>
+              <a:ext uri="{FF2B5EF4-FFF2-40B4-BE49-F238E27FC236}">
+                <a16:creationId xmlns:a16="http://schemas.microsoft.com/office/drawing/2014/main" id="{1E583A77-269F-4C88-917E-3DB46F7E2279}"/>
+              </a:ext>
+            </a:extLst>
+          </p:cNvPr>
+          <p:cNvSpPr/>
+          <p:nvPr/>
+        </p:nvSpPr>
+        <p:spPr>
+          <a:xfrm>
+            <a:off x="1884555" y="4367433"/>
+            <a:ext cx="3479181" cy="801104"/>
+          </a:xfrm>
+          <a:prstGeom prst="rect">
+            <a:avLst/>
+          </a:prstGeom>
+        </p:spPr>
+        <p:style>
+          <a:lnRef idx="2">
+            <a:schemeClr val="accent2">
+              <a:shade val="50000"/>
+            </a:schemeClr>
+          </a:lnRef>
+          <a:fillRef idx="1">
+            <a:schemeClr val="accent2"/>
+          </a:fillRef>
+          <a:effectRef idx="0">
+            <a:schemeClr val="accent2"/>
+          </a:effectRef>
+          <a:fontRef idx="minor">
+            <a:schemeClr val="lt1"/>
+          </a:fontRef>
+        </p:style>
+        <p:txBody>
+          <a:bodyPr rtlCol="0" anchor="ctr"/>
+          <a:lstStyle/>
+          <a:p>
+            <a:pPr algn="ctr"/>
+            <a:r>
+              <a:rPr lang="hu-HU" dirty="0" err="1"/>
+              <a:t>Bet</a:t>
+            </a:r>
+            <a:r>
+              <a:rPr lang="hu-HU" dirty="0"/>
+              <a:t> 4</a:t>
+            </a:r>
+            <a:endParaRPr lang="en-US" dirty="0"/>
+          </a:p>
+        </p:txBody>
+      </p:sp>
+      <p:sp>
+        <p:nvSpPr>
+          <p:cNvPr id="11" name="Téglalap 10">
+            <a:extLst>
+              <a:ext uri="{FF2B5EF4-FFF2-40B4-BE49-F238E27FC236}">
+                <a16:creationId xmlns:a16="http://schemas.microsoft.com/office/drawing/2014/main" id="{02176900-1F1C-4C85-BA31-47162767EA00}"/>
+              </a:ext>
+            </a:extLst>
+          </p:cNvPr>
+          <p:cNvSpPr/>
+          <p:nvPr/>
+        </p:nvSpPr>
+        <p:spPr>
+          <a:xfrm>
+            <a:off x="1884555" y="5168537"/>
+            <a:ext cx="3479181" cy="801104"/>
+          </a:xfrm>
+          <a:prstGeom prst="rect">
+            <a:avLst/>
+          </a:prstGeom>
+        </p:spPr>
+        <p:style>
+          <a:lnRef idx="2">
+            <a:schemeClr val="accent4">
+              <a:shade val="50000"/>
+            </a:schemeClr>
+          </a:lnRef>
+          <a:fillRef idx="1">
+            <a:schemeClr val="accent4"/>
+          </a:fillRef>
+          <a:effectRef idx="0">
+            <a:schemeClr val="accent4"/>
+          </a:effectRef>
+          <a:fontRef idx="minor">
+            <a:schemeClr val="lt1"/>
+          </a:fontRef>
+        </p:style>
+        <p:txBody>
+          <a:bodyPr rtlCol="0" anchor="ctr"/>
+          <a:lstStyle/>
+          <a:p>
+            <a:pPr algn="ctr"/>
+            <a:endParaRPr lang="en-US"/>
+          </a:p>
+        </p:txBody>
+      </p:sp>
+      <p:sp>
+        <p:nvSpPr>
+          <p:cNvPr id="12" name="Téglalap 11">
+            <a:extLst>
+              <a:ext uri="{FF2B5EF4-FFF2-40B4-BE49-F238E27FC236}">
+                <a16:creationId xmlns:a16="http://schemas.microsoft.com/office/drawing/2014/main" id="{1C200257-6D8C-4682-94BF-EBB16DB11D82}"/>
+              </a:ext>
+            </a:extLst>
+          </p:cNvPr>
+          <p:cNvSpPr/>
+          <p:nvPr/>
+        </p:nvSpPr>
+        <p:spPr>
+          <a:xfrm>
+            <a:off x="5797296" y="1839339"/>
+            <a:ext cx="2523744" cy="914400"/>
+          </a:xfrm>
+          <a:prstGeom prst="rect">
+            <a:avLst/>
+          </a:prstGeom>
+        </p:spPr>
+        <p:style>
+          <a:lnRef idx="2">
+            <a:schemeClr val="accent3">
+              <a:shade val="50000"/>
+            </a:schemeClr>
+          </a:lnRef>
+          <a:fillRef idx="1">
+            <a:schemeClr val="accent3"/>
+          </a:fillRef>
+          <a:effectRef idx="0">
+            <a:schemeClr val="accent3"/>
+          </a:effectRef>
+          <a:fontRef idx="minor">
+            <a:schemeClr val="lt1"/>
+          </a:fontRef>
+        </p:style>
+        <p:txBody>
+          <a:bodyPr rtlCol="0" anchor="ctr"/>
+          <a:lstStyle/>
+          <a:p>
+            <a:pPr algn="ctr"/>
+            <a:r>
+              <a:rPr lang="hu-HU" dirty="0"/>
+              <a:t>Szinek itt a </a:t>
+            </a:r>
+            <a:r>
+              <a:rPr lang="hu-HU" dirty="0" err="1"/>
+              <a:t>hatarido</a:t>
+            </a:r>
+            <a:r>
+              <a:rPr lang="hu-HU" dirty="0"/>
+              <a:t> </a:t>
+            </a:r>
+            <a:r>
+              <a:rPr lang="hu-HU" dirty="0" err="1"/>
+              <a:t>gyakorisagat</a:t>
+            </a:r>
+            <a:r>
+              <a:rPr lang="hu-HU" dirty="0"/>
+              <a:t> mutatja</a:t>
+            </a:r>
+            <a:endParaRPr lang="en-US" dirty="0"/>
+          </a:p>
+        </p:txBody>
+      </p:sp>
+    </p:spTree>
+    <p:extLst>
+      <p:ext uri="{BB962C8B-B14F-4D97-AF65-F5344CB8AC3E}">
+        <p14:creationId xmlns:p14="http://schemas.microsoft.com/office/powerpoint/2010/main" val="3770477475"/>
+      </p:ext>
+    </p:extLst>
+  </p:cSld>
+  <p:clrMapOvr>
+    <a:masterClrMapping/>
+  </p:clrMapOvr>
+</p:sld>
+</file>
+
+<file path=ppt/slides/slide4.xml><?xml version="1.0" encoding="utf-8"?>
+<p:sld xmlns:a="http://schemas.openxmlformats.org/drawingml/2006/main" xmlns:r="http://schemas.openxmlformats.org/officeDocument/2006/relationships" xmlns:p="http://schemas.openxmlformats.org/presentationml/2006/main">
+  <p:cSld>
+    <p:spTree>
+      <p:nvGrpSpPr>
+        <p:cNvPr id="1" name=""/>
+        <p:cNvGrpSpPr/>
+        <p:nvPr/>
+      </p:nvGrpSpPr>
+      <p:grpSpPr>
+        <a:xfrm>
+          <a:off x="0" y="0"/>
+          <a:ext cx="0" cy="0"/>
+          <a:chOff x="0" y="0"/>
+          <a:chExt cx="0" cy="0"/>
+        </a:xfrm>
+      </p:grpSpPr>
+      <p:sp>
+        <p:nvSpPr>
+          <p:cNvPr id="2" name="Cím 1">
+            <a:extLst>
+              <a:ext uri="{FF2B5EF4-FFF2-40B4-BE49-F238E27FC236}">
+                <a16:creationId xmlns:a16="http://schemas.microsoft.com/office/drawing/2014/main" id="{594A4525-F6B4-4220-9B8E-E1B07188CAE5}"/>
+              </a:ext>
+            </a:extLst>
+          </p:cNvPr>
+          <p:cNvSpPr>
+            <a:spLocks noGrp="1"/>
+          </p:cNvSpPr>
+          <p:nvPr>
+            <p:ph type="title"/>
+          </p:nvPr>
+        </p:nvSpPr>
+        <p:spPr>
+          <a:xfrm>
+            <a:off x="1719817" y="456355"/>
+            <a:ext cx="10515600" cy="1325563"/>
+          </a:xfrm>
+        </p:spPr>
+        <p:txBody>
+          <a:bodyPr/>
+          <a:lstStyle/>
+          <a:p>
+            <a:pPr algn="ctr"/>
+            <a:r>
+              <a:rPr lang="hu-HU" dirty="0" err="1"/>
+              <a:t>Bet</a:t>
+            </a:r>
+            <a:r>
+              <a:rPr lang="hu-HU" dirty="0"/>
+              <a:t> nézet</a:t>
+            </a:r>
+            <a:endParaRPr lang="en-US" dirty="0"/>
+          </a:p>
+        </p:txBody>
+      </p:sp>
+      <p:sp>
+        <p:nvSpPr>
+          <p:cNvPr id="4" name="Téglalap 3">
+            <a:extLst>
+              <a:ext uri="{FF2B5EF4-FFF2-40B4-BE49-F238E27FC236}">
+                <a16:creationId xmlns:a16="http://schemas.microsoft.com/office/drawing/2014/main" id="{19E9C0B5-5DC3-4034-B4A5-1633991AC59F}"/>
+              </a:ext>
+            </a:extLst>
+          </p:cNvPr>
+          <p:cNvSpPr/>
+          <p:nvPr/>
+        </p:nvSpPr>
+        <p:spPr>
+          <a:xfrm>
+            <a:off x="1884556" y="1137424"/>
+            <a:ext cx="3479181" cy="5296830"/>
+          </a:xfrm>
+          <a:prstGeom prst="rect">
+            <a:avLst/>
+          </a:prstGeom>
+        </p:spPr>
+        <p:style>
+          <a:lnRef idx="2">
+            <a:schemeClr val="accent1">
+              <a:shade val="50000"/>
+            </a:schemeClr>
+          </a:lnRef>
+          <a:fillRef idx="1">
+            <a:schemeClr val="accent1"/>
+          </a:fillRef>
+          <a:effectRef idx="0">
+            <a:schemeClr val="accent1"/>
+          </a:effectRef>
+          <a:fontRef idx="minor">
+            <a:schemeClr val="lt1"/>
+          </a:fontRef>
+        </p:style>
+        <p:txBody>
+          <a:bodyPr rtlCol="0" anchor="ctr"/>
+          <a:lstStyle/>
+          <a:p>
+            <a:pPr algn="ctr"/>
+            <a:endParaRPr lang="en-US" dirty="0"/>
+          </a:p>
+        </p:txBody>
+      </p:sp>
+      <p:sp>
+        <p:nvSpPr>
+          <p:cNvPr id="5" name="Téglalap 4">
+            <a:extLst>
+              <a:ext uri="{FF2B5EF4-FFF2-40B4-BE49-F238E27FC236}">
+                <a16:creationId xmlns:a16="http://schemas.microsoft.com/office/drawing/2014/main" id="{368C9006-7B65-4472-BE6C-60C8E4C27085}"/>
+              </a:ext>
+            </a:extLst>
+          </p:cNvPr>
+          <p:cNvSpPr/>
+          <p:nvPr/>
+        </p:nvSpPr>
+        <p:spPr>
+          <a:xfrm>
+            <a:off x="1884555" y="1137424"/>
+            <a:ext cx="3479181" cy="801104"/>
+          </a:xfrm>
+          <a:prstGeom prst="rect">
+            <a:avLst/>
+          </a:prstGeom>
+        </p:spPr>
+        <p:style>
+          <a:lnRef idx="2">
+            <a:schemeClr val="dk1">
+              <a:shade val="50000"/>
+            </a:schemeClr>
+          </a:lnRef>
+          <a:fillRef idx="1">
+            <a:schemeClr val="dk1"/>
+          </a:fillRef>
+          <a:effectRef idx="0">
+            <a:schemeClr val="dk1"/>
+          </a:effectRef>
+          <a:fontRef idx="minor">
+            <a:schemeClr val="lt1"/>
+          </a:fontRef>
+        </p:style>
+        <p:txBody>
+          <a:bodyPr rtlCol="0" anchor="ctr"/>
+          <a:lstStyle/>
+          <a:p>
+            <a:pPr algn="ctr"/>
+            <a:r>
+              <a:rPr lang="hu-HU" dirty="0" err="1"/>
+              <a:t>Bet</a:t>
+            </a:r>
+            <a:r>
+              <a:rPr lang="hu-HU" dirty="0"/>
+              <a:t> 1</a:t>
+            </a:r>
+            <a:endParaRPr lang="en-US" dirty="0"/>
+          </a:p>
+        </p:txBody>
+      </p:sp>
+      <p:sp>
+        <p:nvSpPr>
+          <p:cNvPr id="6" name="Téglalap 5">
+            <a:extLst>
+              <a:ext uri="{FF2B5EF4-FFF2-40B4-BE49-F238E27FC236}">
+                <a16:creationId xmlns:a16="http://schemas.microsoft.com/office/drawing/2014/main" id="{18B2E508-7CD4-42E0-9407-4F3AABD95E6F}"/>
+              </a:ext>
+            </a:extLst>
+          </p:cNvPr>
+          <p:cNvSpPr/>
+          <p:nvPr/>
+        </p:nvSpPr>
+        <p:spPr>
+          <a:xfrm>
+            <a:off x="1884555" y="1975104"/>
+            <a:ext cx="3479181" cy="4459150"/>
+          </a:xfrm>
+          <a:prstGeom prst="rect">
+            <a:avLst/>
+          </a:prstGeom>
+        </p:spPr>
+        <p:style>
+          <a:lnRef idx="2">
+            <a:schemeClr val="accent1">
+              <a:shade val="50000"/>
+            </a:schemeClr>
+          </a:lnRef>
+          <a:fillRef idx="1">
+            <a:schemeClr val="accent1"/>
+          </a:fillRef>
+          <a:effectRef idx="0">
+            <a:schemeClr val="accent1"/>
+          </a:effectRef>
+          <a:fontRef idx="minor">
+            <a:schemeClr val="lt1"/>
+          </a:fontRef>
+        </p:style>
+        <p:txBody>
+          <a:bodyPr rtlCol="0" anchor="ctr"/>
+          <a:lstStyle/>
+          <a:p>
+            <a:pPr algn="ctr"/>
+            <a:r>
+              <a:rPr lang="hu-HU" dirty="0"/>
+              <a:t>Lista az emberekről</a:t>
+            </a:r>
+            <a:endParaRPr lang="en-US" dirty="0"/>
+          </a:p>
+        </p:txBody>
+      </p:sp>
+      <p:sp>
+        <p:nvSpPr>
+          <p:cNvPr id="11" name="Téglalap 10">
+            <a:extLst>
+              <a:ext uri="{FF2B5EF4-FFF2-40B4-BE49-F238E27FC236}">
+                <a16:creationId xmlns:a16="http://schemas.microsoft.com/office/drawing/2014/main" id="{C1E1C5CA-5BFE-498C-8CA7-C716E727B147}"/>
+              </a:ext>
+            </a:extLst>
+          </p:cNvPr>
+          <p:cNvSpPr/>
+          <p:nvPr/>
+        </p:nvSpPr>
+        <p:spPr>
+          <a:xfrm>
+            <a:off x="1884555" y="1938528"/>
+            <a:ext cx="3479181" cy="801104"/>
+          </a:xfrm>
+          <a:prstGeom prst="rect">
+            <a:avLst/>
+          </a:prstGeom>
+        </p:spPr>
+        <p:style>
+          <a:lnRef idx="2">
+            <a:schemeClr val="accent4">
+              <a:shade val="50000"/>
+            </a:schemeClr>
+          </a:lnRef>
+          <a:fillRef idx="1">
+            <a:schemeClr val="accent4"/>
+          </a:fillRef>
+          <a:effectRef idx="0">
+            <a:schemeClr val="accent4"/>
+          </a:effectRef>
+          <a:fontRef idx="minor">
+            <a:schemeClr val="lt1"/>
+          </a:fontRef>
+        </p:style>
+        <p:txBody>
+          <a:bodyPr rtlCol="0" anchor="ctr"/>
+          <a:lstStyle/>
+          <a:p>
+            <a:pPr algn="ctr"/>
+            <a:r>
               <a:rPr lang="hu-HU" dirty="0"/>
               <a:t>Tét idő</a:t>
             </a:r>
@@ -4520,6 +5972,480 @@
     <p:extLst>
       <p:ext uri="{BB962C8B-B14F-4D97-AF65-F5344CB8AC3E}">
         <p14:creationId xmlns:p14="http://schemas.microsoft.com/office/powerpoint/2010/main" val="2915764513"/>
+      </p:ext>
+    </p:extLst>
+  </p:cSld>
+  <p:clrMapOvr>
+    <a:masterClrMapping/>
+  </p:clrMapOvr>
+</p:sld>
+</file>
+
+<file path=ppt/slides/slide5.xml><?xml version="1.0" encoding="utf-8"?>
+<p:sld xmlns:a="http://schemas.openxmlformats.org/drawingml/2006/main" xmlns:r="http://schemas.openxmlformats.org/officeDocument/2006/relationships" xmlns:p="http://schemas.openxmlformats.org/presentationml/2006/main">
+  <p:cSld>
+    <p:spTree>
+      <p:nvGrpSpPr>
+        <p:cNvPr id="1" name=""/>
+        <p:cNvGrpSpPr/>
+        <p:nvPr/>
+      </p:nvGrpSpPr>
+      <p:grpSpPr>
+        <a:xfrm>
+          <a:off x="0" y="0"/>
+          <a:ext cx="0" cy="0"/>
+          <a:chOff x="0" y="0"/>
+          <a:chExt cx="0" cy="0"/>
+        </a:xfrm>
+      </p:grpSpPr>
+      <p:sp>
+        <p:nvSpPr>
+          <p:cNvPr id="2" name="Cím 1">
+            <a:extLst>
+              <a:ext uri="{FF2B5EF4-FFF2-40B4-BE49-F238E27FC236}">
+                <a16:creationId xmlns:a16="http://schemas.microsoft.com/office/drawing/2014/main" id="{66AB7282-FFC4-4E6D-920D-5D2856646CDC}"/>
+              </a:ext>
+            </a:extLst>
+          </p:cNvPr>
+          <p:cNvSpPr>
+            <a:spLocks noGrp="1"/>
+          </p:cNvSpPr>
+          <p:nvPr>
+            <p:ph type="title"/>
+          </p:nvPr>
+        </p:nvSpPr>
+        <p:spPr/>
+        <p:txBody>
+          <a:bodyPr/>
+          <a:lstStyle/>
+          <a:p>
+            <a:r>
+              <a:rPr lang="hu-HU" dirty="0" err="1"/>
+              <a:t>Stats</a:t>
+            </a:r>
+            <a:r>
+              <a:rPr lang="hu-HU" dirty="0"/>
+              <a:t> nézet </a:t>
+            </a:r>
+            <a:r>
+              <a:rPr lang="hu-HU" dirty="0" err="1"/>
+              <a:t>priority</a:t>
+            </a:r>
+            <a:r>
+              <a:rPr lang="hu-HU" dirty="0"/>
+              <a:t>: 2nd</a:t>
+            </a:r>
+            <a:endParaRPr lang="en-US" dirty="0"/>
+          </a:p>
+        </p:txBody>
+      </p:sp>
+      <p:sp>
+        <p:nvSpPr>
+          <p:cNvPr id="4" name="Téglalap 3">
+            <a:extLst>
+              <a:ext uri="{FF2B5EF4-FFF2-40B4-BE49-F238E27FC236}">
+                <a16:creationId xmlns:a16="http://schemas.microsoft.com/office/drawing/2014/main" id="{E484ABF1-6A07-4FF8-801C-4627D76373CA}"/>
+              </a:ext>
+            </a:extLst>
+          </p:cNvPr>
+          <p:cNvSpPr/>
+          <p:nvPr/>
+        </p:nvSpPr>
+        <p:spPr>
+          <a:xfrm>
+            <a:off x="1112520" y="1411954"/>
+            <a:ext cx="3474720" cy="4867783"/>
+          </a:xfrm>
+          <a:prstGeom prst="rect">
+            <a:avLst/>
+          </a:prstGeom>
+        </p:spPr>
+        <p:style>
+          <a:lnRef idx="2">
+            <a:schemeClr val="accent1">
+              <a:shade val="50000"/>
+            </a:schemeClr>
+          </a:lnRef>
+          <a:fillRef idx="1">
+            <a:schemeClr val="accent1"/>
+          </a:fillRef>
+          <a:effectRef idx="0">
+            <a:schemeClr val="accent1"/>
+          </a:effectRef>
+          <a:fontRef idx="minor">
+            <a:schemeClr val="lt1"/>
+          </a:fontRef>
+        </p:style>
+        <p:txBody>
+          <a:bodyPr rtlCol="0" anchor="ctr"/>
+          <a:lstStyle/>
+          <a:p>
+            <a:pPr algn="ctr"/>
+            <a:endParaRPr lang="hu-HU" dirty="0"/>
+          </a:p>
+          <a:p>
+            <a:pPr algn="ctr"/>
+            <a:endParaRPr lang="hu-HU" dirty="0"/>
+          </a:p>
+          <a:p>
+            <a:pPr algn="ctr"/>
+            <a:endParaRPr lang="hu-HU" dirty="0"/>
+          </a:p>
+          <a:p>
+            <a:pPr algn="ctr"/>
+            <a:endParaRPr lang="hu-HU" dirty="0"/>
+          </a:p>
+          <a:p>
+            <a:pPr algn="ctr"/>
+            <a:endParaRPr lang="hu-HU" dirty="0"/>
+          </a:p>
+          <a:p>
+            <a:pPr algn="ctr"/>
+            <a:endParaRPr lang="hu-HU" dirty="0"/>
+          </a:p>
+          <a:p>
+            <a:pPr algn="ctr"/>
+            <a:endParaRPr lang="hu-HU" dirty="0"/>
+          </a:p>
+          <a:p>
+            <a:pPr algn="ctr"/>
+            <a:endParaRPr lang="hu-HU" dirty="0"/>
+          </a:p>
+          <a:p>
+            <a:pPr algn="ctr"/>
+            <a:endParaRPr lang="hu-HU" dirty="0"/>
+          </a:p>
+          <a:p>
+            <a:pPr algn="ctr"/>
+            <a:endParaRPr lang="hu-HU" dirty="0"/>
+          </a:p>
+          <a:p>
+            <a:pPr algn="ctr"/>
+            <a:endParaRPr lang="hu-HU" dirty="0"/>
+          </a:p>
+          <a:p>
+            <a:pPr algn="ctr"/>
+            <a:r>
+              <a:rPr lang="hu-HU" dirty="0" err="1"/>
+              <a:t>Some</a:t>
+            </a:r>
+            <a:r>
+              <a:rPr lang="hu-HU" dirty="0"/>
+              <a:t> </a:t>
+            </a:r>
+            <a:r>
+              <a:rPr lang="hu-HU" dirty="0" err="1"/>
+              <a:t>stats</a:t>
+            </a:r>
+            <a:r>
+              <a:rPr lang="hu-HU" dirty="0"/>
+              <a:t> like: </a:t>
+            </a:r>
+            <a:r>
+              <a:rPr lang="hu-HU" dirty="0" err="1"/>
+              <a:t>break</a:t>
+            </a:r>
+            <a:r>
+              <a:rPr lang="hu-HU" dirty="0"/>
+              <a:t> down, </a:t>
+            </a:r>
+            <a:r>
+              <a:rPr lang="hu-HU" dirty="0" err="1"/>
+              <a:t>average</a:t>
+            </a:r>
+            <a:r>
+              <a:rPr lang="hu-HU" dirty="0"/>
+              <a:t> </a:t>
+            </a:r>
+            <a:r>
+              <a:rPr lang="hu-HU" dirty="0" err="1"/>
+              <a:t>bet</a:t>
+            </a:r>
+            <a:r>
+              <a:rPr lang="hu-HU" dirty="0"/>
+              <a:t> </a:t>
+            </a:r>
+            <a:r>
+              <a:rPr lang="hu-HU" dirty="0" err="1"/>
+              <a:t>time</a:t>
+            </a:r>
+            <a:r>
+              <a:rPr lang="hu-HU" dirty="0"/>
+              <a:t>, most </a:t>
+            </a:r>
+            <a:r>
+              <a:rPr lang="hu-HU" dirty="0" err="1"/>
+              <a:t>lost</a:t>
+            </a:r>
+            <a:r>
+              <a:rPr lang="hu-HU" dirty="0"/>
+              <a:t> </a:t>
+            </a:r>
+            <a:r>
+              <a:rPr lang="hu-HU" dirty="0" err="1"/>
+              <a:t>to</a:t>
+            </a:r>
+            <a:r>
+              <a:rPr lang="hu-HU" dirty="0"/>
+              <a:t>, most </a:t>
+            </a:r>
+            <a:r>
+              <a:rPr lang="hu-HU" dirty="0" err="1"/>
+              <a:t>won</a:t>
+            </a:r>
+            <a:r>
+              <a:rPr lang="hu-HU" dirty="0"/>
+              <a:t> </a:t>
+            </a:r>
+            <a:r>
+              <a:rPr lang="hu-HU" dirty="0" err="1"/>
+              <a:t>bets</a:t>
+            </a:r>
+            <a:r>
+              <a:rPr lang="hu-HU" dirty="0"/>
+              <a:t> </a:t>
+            </a:r>
+            <a:r>
+              <a:rPr lang="hu-HU" dirty="0" err="1"/>
+              <a:t>against</a:t>
+            </a:r>
+            <a:r>
+              <a:rPr lang="hu-HU" dirty="0"/>
+              <a:t>:</a:t>
+            </a:r>
+            <a:endParaRPr lang="en-US" dirty="0"/>
+          </a:p>
+        </p:txBody>
+      </p:sp>
+      <p:graphicFrame>
+        <p:nvGraphicFramePr>
+          <p:cNvPr id="7" name="Diagram 6">
+            <a:extLst>
+              <a:ext uri="{FF2B5EF4-FFF2-40B4-BE49-F238E27FC236}">
+                <a16:creationId xmlns:a16="http://schemas.microsoft.com/office/drawing/2014/main" id="{F499A5DB-5E6F-490E-8C46-DBF0A40E1EFD}"/>
+              </a:ext>
+            </a:extLst>
+          </p:cNvPr>
+          <p:cNvGraphicFramePr/>
+          <p:nvPr>
+            <p:extLst>
+              <p:ext uri="{D42A27DB-BD31-4B8C-83A1-F6EECF244321}">
+                <p14:modId xmlns:p14="http://schemas.microsoft.com/office/powerpoint/2010/main" val="539057533"/>
+              </p:ext>
+            </p:extLst>
+          </p:nvPr>
+        </p:nvGraphicFramePr>
+        <p:xfrm>
+          <a:off x="1112520" y="1863090"/>
+          <a:ext cx="3474720" cy="2955148"/>
+        </p:xfrm>
+        <a:graphic>
+          <a:graphicData uri="http://schemas.openxmlformats.org/drawingml/2006/chart">
+            <c:chart xmlns:c="http://schemas.openxmlformats.org/drawingml/2006/chart" xmlns:r="http://schemas.openxmlformats.org/officeDocument/2006/relationships" r:id="rId2"/>
+          </a:graphicData>
+        </a:graphic>
+      </p:graphicFrame>
+    </p:spTree>
+    <p:extLst>
+      <p:ext uri="{BB962C8B-B14F-4D97-AF65-F5344CB8AC3E}">
+        <p14:creationId xmlns:p14="http://schemas.microsoft.com/office/powerpoint/2010/main" val="634427442"/>
+      </p:ext>
+    </p:extLst>
+  </p:cSld>
+  <p:clrMapOvr>
+    <a:masterClrMapping/>
+  </p:clrMapOvr>
+</p:sld>
+</file>
+
+<file path=ppt/slides/slide6.xml><?xml version="1.0" encoding="utf-8"?>
+<p:sld xmlns:a="http://schemas.openxmlformats.org/drawingml/2006/main" xmlns:r="http://schemas.openxmlformats.org/officeDocument/2006/relationships" xmlns:p="http://schemas.openxmlformats.org/presentationml/2006/main">
+  <p:cSld>
+    <p:spTree>
+      <p:nvGrpSpPr>
+        <p:cNvPr id="1" name=""/>
+        <p:cNvGrpSpPr/>
+        <p:nvPr/>
+      </p:nvGrpSpPr>
+      <p:grpSpPr>
+        <a:xfrm>
+          <a:off x="0" y="0"/>
+          <a:ext cx="0" cy="0"/>
+          <a:chOff x="0" y="0"/>
+          <a:chExt cx="0" cy="0"/>
+        </a:xfrm>
+      </p:grpSpPr>
+      <p:sp>
+        <p:nvSpPr>
+          <p:cNvPr id="2" name="Cím 1">
+            <a:extLst>
+              <a:ext uri="{FF2B5EF4-FFF2-40B4-BE49-F238E27FC236}">
+                <a16:creationId xmlns:a16="http://schemas.microsoft.com/office/drawing/2014/main" id="{9F62C3A3-8B7E-4330-8C09-F50D7F1A9CBE}"/>
+              </a:ext>
+            </a:extLst>
+          </p:cNvPr>
+          <p:cNvSpPr>
+            <a:spLocks noGrp="1"/>
+          </p:cNvSpPr>
+          <p:nvPr>
+            <p:ph type="title"/>
+          </p:nvPr>
+        </p:nvSpPr>
+        <p:spPr/>
+        <p:txBody>
+          <a:bodyPr/>
+          <a:lstStyle/>
+          <a:p>
+            <a:r>
+              <a:rPr lang="hu-HU" dirty="0" err="1"/>
+              <a:t>Settings</a:t>
+            </a:r>
+            <a:r>
+              <a:rPr lang="hu-HU" dirty="0"/>
+              <a:t> </a:t>
+            </a:r>
+            <a:r>
+              <a:rPr lang="hu-HU" dirty="0" err="1"/>
+              <a:t>priority</a:t>
+            </a:r>
+            <a:r>
+              <a:rPr lang="hu-HU" dirty="0"/>
+              <a:t>: 2nd</a:t>
+            </a:r>
+            <a:endParaRPr lang="en-US" dirty="0"/>
+          </a:p>
+        </p:txBody>
+      </p:sp>
+      <p:sp>
+        <p:nvSpPr>
+          <p:cNvPr id="4" name="Téglalap 3">
+            <a:extLst>
+              <a:ext uri="{FF2B5EF4-FFF2-40B4-BE49-F238E27FC236}">
+                <a16:creationId xmlns:a16="http://schemas.microsoft.com/office/drawing/2014/main" id="{D75E3134-D00F-46BA-ABD1-EB7B51CA9EBE}"/>
+              </a:ext>
+            </a:extLst>
+          </p:cNvPr>
+          <p:cNvSpPr/>
+          <p:nvPr/>
+        </p:nvSpPr>
+        <p:spPr>
+          <a:xfrm>
+            <a:off x="998220" y="1789144"/>
+            <a:ext cx="3474720" cy="4867783"/>
+          </a:xfrm>
+          <a:prstGeom prst="rect">
+            <a:avLst/>
+          </a:prstGeom>
+        </p:spPr>
+        <p:style>
+          <a:lnRef idx="2">
+            <a:schemeClr val="accent1">
+              <a:shade val="50000"/>
+            </a:schemeClr>
+          </a:lnRef>
+          <a:fillRef idx="1">
+            <a:schemeClr val="accent1"/>
+          </a:fillRef>
+          <a:effectRef idx="0">
+            <a:schemeClr val="accent1"/>
+          </a:effectRef>
+          <a:fontRef idx="minor">
+            <a:schemeClr val="lt1"/>
+          </a:fontRef>
+        </p:style>
+        <p:txBody>
+          <a:bodyPr rtlCol="0" anchor="ctr"/>
+          <a:lstStyle/>
+          <a:p>
+            <a:pPr algn="ctr"/>
+            <a:endParaRPr lang="hu-HU" dirty="0"/>
+          </a:p>
+          <a:p>
+            <a:pPr algn="ctr"/>
+            <a:endParaRPr lang="hu-HU" dirty="0"/>
+          </a:p>
+          <a:p>
+            <a:pPr algn="ctr"/>
+            <a:endParaRPr lang="hu-HU" dirty="0"/>
+          </a:p>
+          <a:p>
+            <a:pPr algn="ctr"/>
+            <a:endParaRPr lang="hu-HU" dirty="0"/>
+          </a:p>
+          <a:p>
+            <a:pPr algn="ctr"/>
+            <a:endParaRPr lang="hu-HU" dirty="0"/>
+          </a:p>
+          <a:p>
+            <a:pPr algn="ctr"/>
+            <a:endParaRPr lang="hu-HU" dirty="0"/>
+          </a:p>
+          <a:p>
+            <a:pPr algn="ctr"/>
+            <a:endParaRPr lang="hu-HU" dirty="0"/>
+          </a:p>
+          <a:p>
+            <a:pPr algn="ctr"/>
+            <a:endParaRPr lang="hu-HU" dirty="0"/>
+          </a:p>
+          <a:p>
+            <a:pPr algn="ctr"/>
+            <a:endParaRPr lang="hu-HU" dirty="0"/>
+          </a:p>
+          <a:p>
+            <a:pPr algn="ctr"/>
+            <a:endParaRPr lang="hu-HU" dirty="0"/>
+          </a:p>
+          <a:p>
+            <a:pPr algn="ctr"/>
+            <a:endParaRPr lang="hu-HU" dirty="0"/>
+          </a:p>
+          <a:p>
+            <a:pPr algn="ctr"/>
+            <a:r>
+              <a:rPr lang="hu-HU" dirty="0" err="1"/>
+              <a:t>Some</a:t>
+            </a:r>
+            <a:r>
+              <a:rPr lang="hu-HU" dirty="0"/>
+              <a:t> </a:t>
+            </a:r>
+            <a:r>
+              <a:rPr lang="hu-HU" dirty="0" err="1"/>
+              <a:t>settings</a:t>
+            </a:r>
+            <a:r>
+              <a:rPr lang="hu-HU" dirty="0"/>
+              <a:t> </a:t>
+            </a:r>
+            <a:r>
+              <a:rPr lang="hu-HU" dirty="0" err="1"/>
+              <a:t>maybe</a:t>
+            </a:r>
+            <a:r>
+              <a:rPr lang="hu-HU" dirty="0"/>
+              <a:t> </a:t>
+            </a:r>
+            <a:r>
+              <a:rPr lang="hu-HU" dirty="0" err="1"/>
+              <a:t>colours</a:t>
+            </a:r>
+            <a:r>
+              <a:rPr lang="hu-HU" dirty="0"/>
+              <a:t> and </a:t>
+            </a:r>
+            <a:r>
+              <a:rPr lang="hu-HU" dirty="0" err="1"/>
+              <a:t>stuff</a:t>
+            </a:r>
+            <a:endParaRPr lang="en-US" dirty="0"/>
+          </a:p>
+        </p:txBody>
+      </p:sp>
+    </p:spTree>
+    <p:extLst>
+      <p:ext uri="{BB962C8B-B14F-4D97-AF65-F5344CB8AC3E}">
+        <p14:creationId xmlns:p14="http://schemas.microsoft.com/office/powerpoint/2010/main" val="3909395213"/>
       </p:ext>
     </p:extLst>
   </p:cSld>

</xml_diff>